<commit_message>
week 1 final commit
</commit_message>
<xml_diff>
--- a/Slide/Web Design 2.pptx
+++ b/Slide/Web Design 2.pptx
@@ -24,12 +24,19 @@
     <p:sldId id="276" r:id="rId18"/>
     <p:sldId id="268" r:id="rId19"/>
     <p:sldId id="277" r:id="rId20"/>
-    <p:sldId id="269" r:id="rId21"/>
-    <p:sldId id="278" r:id="rId22"/>
-    <p:sldId id="270" r:id="rId23"/>
-    <p:sldId id="279" r:id="rId24"/>
-    <p:sldId id="271" r:id="rId25"/>
-    <p:sldId id="280" r:id="rId26"/>
+    <p:sldId id="283" r:id="rId21"/>
+    <p:sldId id="284" r:id="rId22"/>
+    <p:sldId id="269" r:id="rId23"/>
+    <p:sldId id="278" r:id="rId24"/>
+    <p:sldId id="285" r:id="rId25"/>
+    <p:sldId id="279" r:id="rId26"/>
+    <p:sldId id="286" r:id="rId27"/>
+    <p:sldId id="280" r:id="rId28"/>
+    <p:sldId id="287" r:id="rId29"/>
+    <p:sldId id="288" r:id="rId30"/>
+    <p:sldId id="289" r:id="rId31"/>
+    <p:sldId id="290" r:id="rId32"/>
+    <p:sldId id="291" r:id="rId33"/>
   </p:sldIdLst>
   <p:sldSz cx="12192000" cy="6858000"/>
   <p:notesSz cx="6858000" cy="9144000"/>
@@ -139,7 +146,7 @@
 <file path=ppt/revisionInfo.xml><?xml version="1.0" encoding="utf-8"?>
 <p1510:revInfo xmlns:a="http://schemas.openxmlformats.org/drawingml/2006/main" xmlns:r="http://schemas.openxmlformats.org/officeDocument/2006/relationships" xmlns:p1510="http://schemas.microsoft.com/office/powerpoint/2015/10/main">
   <p1510:revLst>
-    <p1510:client id="{0F61687B-2F3F-47F8-8EB1-337DF2D05EEF}" v="66" dt="2023-09-26T11:57:55.289"/>
+    <p1510:client id="{0F61687B-2F3F-47F8-8EB1-337DF2D05EEF}" v="81" dt="2023-09-26T16:48:40.701"/>
   </p1510:revLst>
 </p1510:revInfo>
 </file>
@@ -149,7 +156,7 @@
   <pc:docChgLst>
     <pc:chgData name="kheang ly" userId="0b0eb30075b8a81a" providerId="LiveId" clId="{0F61687B-2F3F-47F8-8EB1-337DF2D05EEF}"/>
     <pc:docChg chg="undo custSel addSld delSld modSld sldOrd">
-      <pc:chgData name="kheang ly" userId="0b0eb30075b8a81a" providerId="LiveId" clId="{0F61687B-2F3F-47F8-8EB1-337DF2D05EEF}" dt="2023-09-26T12:00:22.167" v="2643" actId="403"/>
+      <pc:chgData name="kheang ly" userId="0b0eb30075b8a81a" providerId="LiveId" clId="{0F61687B-2F3F-47F8-8EB1-337DF2D05EEF}" dt="2023-09-26T16:49:16.728" v="4312" actId="1076"/>
       <pc:docMkLst>
         <pc:docMk/>
       </pc:docMkLst>
@@ -391,13 +398,13 @@
         </pc:picChg>
       </pc:sldChg>
       <pc:sldChg chg="modSp add mod">
-        <pc:chgData name="kheang ly" userId="0b0eb30075b8a81a" providerId="LiveId" clId="{0F61687B-2F3F-47F8-8EB1-337DF2D05EEF}" dt="2023-09-26T10:49:57.108" v="1474" actId="20577"/>
+        <pc:chgData name="kheang ly" userId="0b0eb30075b8a81a" providerId="LiveId" clId="{0F61687B-2F3F-47F8-8EB1-337DF2D05EEF}" dt="2023-09-26T14:50:23.156" v="2782" actId="1076"/>
         <pc:sldMkLst>
           <pc:docMk/>
           <pc:sldMk cId="85035572" sldId="267"/>
         </pc:sldMkLst>
         <pc:spChg chg="mod">
-          <ac:chgData name="kheang ly" userId="0b0eb30075b8a81a" providerId="LiveId" clId="{0F61687B-2F3F-47F8-8EB1-337DF2D05EEF}" dt="2023-09-26T10:49:57.108" v="1474" actId="20577"/>
+          <ac:chgData name="kheang ly" userId="0b0eb30075b8a81a" providerId="LiveId" clId="{0F61687B-2F3F-47F8-8EB1-337DF2D05EEF}" dt="2023-09-26T14:50:23.156" v="2782" actId="1076"/>
           <ac:spMkLst>
             <pc:docMk/>
             <pc:sldMk cId="85035572" sldId="267"/>
@@ -406,13 +413,13 @@
         </pc:spChg>
       </pc:sldChg>
       <pc:sldChg chg="modSp add mod">
-        <pc:chgData name="kheang ly" userId="0b0eb30075b8a81a" providerId="LiveId" clId="{0F61687B-2F3F-47F8-8EB1-337DF2D05EEF}" dt="2023-09-26T11:11:55.220" v="1486" actId="20577"/>
+        <pc:chgData name="kheang ly" userId="0b0eb30075b8a81a" providerId="LiveId" clId="{0F61687B-2F3F-47F8-8EB1-337DF2D05EEF}" dt="2023-09-26T15:39:37.533" v="3095" actId="404"/>
         <pc:sldMkLst>
           <pc:docMk/>
           <pc:sldMk cId="2317476096" sldId="268"/>
         </pc:sldMkLst>
         <pc:spChg chg="mod">
-          <ac:chgData name="kheang ly" userId="0b0eb30075b8a81a" providerId="LiveId" clId="{0F61687B-2F3F-47F8-8EB1-337DF2D05EEF}" dt="2023-09-26T11:11:55.220" v="1486" actId="20577"/>
+          <ac:chgData name="kheang ly" userId="0b0eb30075b8a81a" providerId="LiveId" clId="{0F61687B-2F3F-47F8-8EB1-337DF2D05EEF}" dt="2023-09-26T15:39:37.533" v="3095" actId="404"/>
           <ac:spMkLst>
             <pc:docMk/>
             <pc:sldMk cId="2317476096" sldId="268"/>
@@ -421,13 +428,13 @@
         </pc:spChg>
       </pc:sldChg>
       <pc:sldChg chg="modSp add mod">
-        <pc:chgData name="kheang ly" userId="0b0eb30075b8a81a" providerId="LiveId" clId="{0F61687B-2F3F-47F8-8EB1-337DF2D05EEF}" dt="2023-09-26T11:13:01.462" v="1515" actId="20577"/>
+        <pc:chgData name="kheang ly" userId="0b0eb30075b8a81a" providerId="LiveId" clId="{0F61687B-2F3F-47F8-8EB1-337DF2D05EEF}" dt="2023-09-26T15:50:35.568" v="3282" actId="20577"/>
         <pc:sldMkLst>
           <pc:docMk/>
           <pc:sldMk cId="3649901522" sldId="269"/>
         </pc:sldMkLst>
         <pc:spChg chg="mod">
-          <ac:chgData name="kheang ly" userId="0b0eb30075b8a81a" providerId="LiveId" clId="{0F61687B-2F3F-47F8-8EB1-337DF2D05EEF}" dt="2023-09-26T11:13:01.462" v="1515" actId="20577"/>
+          <ac:chgData name="kheang ly" userId="0b0eb30075b8a81a" providerId="LiveId" clId="{0F61687B-2F3F-47F8-8EB1-337DF2D05EEF}" dt="2023-09-26T15:50:35.568" v="3282" actId="20577"/>
           <ac:spMkLst>
             <pc:docMk/>
             <pc:sldMk cId="3649901522" sldId="269"/>
@@ -435,8 +442,8 @@
           </ac:spMkLst>
         </pc:spChg>
       </pc:sldChg>
-      <pc:sldChg chg="modSp add mod">
-        <pc:chgData name="kheang ly" userId="0b0eb30075b8a81a" providerId="LiveId" clId="{0F61687B-2F3F-47F8-8EB1-337DF2D05EEF}" dt="2023-09-26T11:13:31.467" v="1535" actId="20577"/>
+      <pc:sldChg chg="modSp add del mod">
+        <pc:chgData name="kheang ly" userId="0b0eb30075b8a81a" providerId="LiveId" clId="{0F61687B-2F3F-47F8-8EB1-337DF2D05EEF}" dt="2023-09-26T16:12:16.692" v="3283" actId="47"/>
         <pc:sldMkLst>
           <pc:docMk/>
           <pc:sldMk cId="4004303302" sldId="270"/>
@@ -450,8 +457,8 @@
           </ac:spMkLst>
         </pc:spChg>
       </pc:sldChg>
-      <pc:sldChg chg="modSp add mod">
-        <pc:chgData name="kheang ly" userId="0b0eb30075b8a81a" providerId="LiveId" clId="{0F61687B-2F3F-47F8-8EB1-337DF2D05EEF}" dt="2023-09-26T11:13:58.343" v="1546" actId="20577"/>
+      <pc:sldChg chg="modSp add del mod">
+        <pc:chgData name="kheang ly" userId="0b0eb30075b8a81a" providerId="LiveId" clId="{0F61687B-2F3F-47F8-8EB1-337DF2D05EEF}" dt="2023-09-26T16:13:25.377" v="3322" actId="47"/>
         <pc:sldMkLst>
           <pc:docMk/>
           <pc:sldMk cId="3282565304" sldId="271"/>
@@ -572,6 +579,180 @@
           <pc:docMk/>
           <pc:sldMk cId="1950471989" sldId="282"/>
         </pc:sldMkLst>
+      </pc:sldChg>
+      <pc:sldChg chg="modSp add mod">
+        <pc:chgData name="kheang ly" userId="0b0eb30075b8a81a" providerId="LiveId" clId="{0F61687B-2F3F-47F8-8EB1-337DF2D05EEF}" dt="2023-09-26T15:49:42.021" v="3280" actId="1076"/>
+        <pc:sldMkLst>
+          <pc:docMk/>
+          <pc:sldMk cId="1189373135" sldId="283"/>
+        </pc:sldMkLst>
+        <pc:spChg chg="mod">
+          <ac:chgData name="kheang ly" userId="0b0eb30075b8a81a" providerId="LiveId" clId="{0F61687B-2F3F-47F8-8EB1-337DF2D05EEF}" dt="2023-09-26T15:49:42.021" v="3280" actId="1076"/>
+          <ac:spMkLst>
+            <pc:docMk/>
+            <pc:sldMk cId="1189373135" sldId="283"/>
+            <ac:spMk id="2" creationId="{5366957A-F718-3CBF-05E0-59417ACEB6A8}"/>
+          </ac:spMkLst>
+        </pc:spChg>
+      </pc:sldChg>
+      <pc:sldChg chg="add">
+        <pc:chgData name="kheang ly" userId="0b0eb30075b8a81a" providerId="LiveId" clId="{0F61687B-2F3F-47F8-8EB1-337DF2D05EEF}" dt="2023-09-26T15:49:44.890" v="3281"/>
+        <pc:sldMkLst>
+          <pc:docMk/>
+          <pc:sldMk cId="1113286957" sldId="284"/>
+        </pc:sldMkLst>
+      </pc:sldChg>
+      <pc:sldChg chg="modSp add mod">
+        <pc:chgData name="kheang ly" userId="0b0eb30075b8a81a" providerId="LiveId" clId="{0F61687B-2F3F-47F8-8EB1-337DF2D05EEF}" dt="2023-09-26T16:13:16.901" v="3321" actId="20577"/>
+        <pc:sldMkLst>
+          <pc:docMk/>
+          <pc:sldMk cId="3829970568" sldId="285"/>
+        </pc:sldMkLst>
+        <pc:spChg chg="mod">
+          <ac:chgData name="kheang ly" userId="0b0eb30075b8a81a" providerId="LiveId" clId="{0F61687B-2F3F-47F8-8EB1-337DF2D05EEF}" dt="2023-09-26T16:13:16.901" v="3321" actId="20577"/>
+          <ac:spMkLst>
+            <pc:docMk/>
+            <pc:sldMk cId="3829970568" sldId="285"/>
+            <ac:spMk id="2" creationId="{5366957A-F718-3CBF-05E0-59417ACEB6A8}"/>
+          </ac:spMkLst>
+        </pc:spChg>
+      </pc:sldChg>
+      <pc:sldChg chg="modSp add mod">
+        <pc:chgData name="kheang ly" userId="0b0eb30075b8a81a" providerId="LiveId" clId="{0F61687B-2F3F-47F8-8EB1-337DF2D05EEF}" dt="2023-09-26T16:14:55.168" v="3369" actId="5793"/>
+        <pc:sldMkLst>
+          <pc:docMk/>
+          <pc:sldMk cId="2978452678" sldId="286"/>
+        </pc:sldMkLst>
+        <pc:spChg chg="mod">
+          <ac:chgData name="kheang ly" userId="0b0eb30075b8a81a" providerId="LiveId" clId="{0F61687B-2F3F-47F8-8EB1-337DF2D05EEF}" dt="2023-09-26T16:14:55.168" v="3369" actId="5793"/>
+          <ac:spMkLst>
+            <pc:docMk/>
+            <pc:sldMk cId="2978452678" sldId="286"/>
+            <ac:spMk id="2" creationId="{5366957A-F718-3CBF-05E0-59417ACEB6A8}"/>
+          </ac:spMkLst>
+        </pc:spChg>
+      </pc:sldChg>
+      <pc:sldChg chg="modSp add mod">
+        <pc:chgData name="kheang ly" userId="0b0eb30075b8a81a" providerId="LiveId" clId="{0F61687B-2F3F-47F8-8EB1-337DF2D05EEF}" dt="2023-09-26T16:34:20.642" v="3402" actId="20577"/>
+        <pc:sldMkLst>
+          <pc:docMk/>
+          <pc:sldMk cId="3658540392" sldId="287"/>
+        </pc:sldMkLst>
+        <pc:spChg chg="mod">
+          <ac:chgData name="kheang ly" userId="0b0eb30075b8a81a" providerId="LiveId" clId="{0F61687B-2F3F-47F8-8EB1-337DF2D05EEF}" dt="2023-09-26T16:34:20.642" v="3402" actId="20577"/>
+          <ac:spMkLst>
+            <pc:docMk/>
+            <pc:sldMk cId="3658540392" sldId="287"/>
+            <ac:spMk id="2" creationId="{5366957A-F718-3CBF-05E0-59417ACEB6A8}"/>
+          </ac:spMkLst>
+        </pc:spChg>
+      </pc:sldChg>
+      <pc:sldChg chg="addSp delSp modSp add mod">
+        <pc:chgData name="kheang ly" userId="0b0eb30075b8a81a" providerId="LiveId" clId="{0F61687B-2F3F-47F8-8EB1-337DF2D05EEF}" dt="2023-09-26T16:38:50.999" v="3611" actId="14100"/>
+        <pc:sldMkLst>
+          <pc:docMk/>
+          <pc:sldMk cId="1573000916" sldId="288"/>
+        </pc:sldMkLst>
+        <pc:spChg chg="mod">
+          <ac:chgData name="kheang ly" userId="0b0eb30075b8a81a" providerId="LiveId" clId="{0F61687B-2F3F-47F8-8EB1-337DF2D05EEF}" dt="2023-09-26T16:37:18.621" v="3590" actId="20577"/>
+          <ac:spMkLst>
+            <pc:docMk/>
+            <pc:sldMk cId="1573000916" sldId="288"/>
+            <ac:spMk id="2" creationId="{5366957A-F718-3CBF-05E0-59417ACEB6A8}"/>
+          </ac:spMkLst>
+        </pc:spChg>
+        <pc:spChg chg="add mod">
+          <ac:chgData name="kheang ly" userId="0b0eb30075b8a81a" providerId="LiveId" clId="{0F61687B-2F3F-47F8-8EB1-337DF2D05EEF}" dt="2023-09-26T16:38:50.999" v="3611" actId="14100"/>
+          <ac:spMkLst>
+            <pc:docMk/>
+            <pc:sldMk cId="1573000916" sldId="288"/>
+            <ac:spMk id="3" creationId="{D3703452-55C6-BCCE-67D3-D23003ECAFC6}"/>
+          </ac:spMkLst>
+        </pc:spChg>
+        <pc:picChg chg="add del mod">
+          <ac:chgData name="kheang ly" userId="0b0eb30075b8a81a" providerId="LiveId" clId="{0F61687B-2F3F-47F8-8EB1-337DF2D05EEF}" dt="2023-09-26T16:34:36.705" v="3406" actId="1076"/>
+          <ac:picMkLst>
+            <pc:docMk/>
+            <pc:sldMk cId="1573000916" sldId="288"/>
+            <ac:picMk id="7" creationId="{26F87EE6-249B-FFEB-B903-3F54D0D4EA22}"/>
+          </ac:picMkLst>
+        </pc:picChg>
+      </pc:sldChg>
+      <pc:sldChg chg="add del">
+        <pc:chgData name="kheang ly" userId="0b0eb30075b8a81a" providerId="LiveId" clId="{0F61687B-2F3F-47F8-8EB1-337DF2D05EEF}" dt="2023-09-26T16:38:56.047" v="3612" actId="47"/>
+        <pc:sldMkLst>
+          <pc:docMk/>
+          <pc:sldMk cId="944642449" sldId="289"/>
+        </pc:sldMkLst>
+      </pc:sldChg>
+      <pc:sldChg chg="delSp modSp add mod">
+        <pc:chgData name="kheang ly" userId="0b0eb30075b8a81a" providerId="LiveId" clId="{0F61687B-2F3F-47F8-8EB1-337DF2D05EEF}" dt="2023-09-26T16:47:32.526" v="4239" actId="20577"/>
+        <pc:sldMkLst>
+          <pc:docMk/>
+          <pc:sldMk cId="1224539229" sldId="289"/>
+        </pc:sldMkLst>
+        <pc:spChg chg="mod">
+          <ac:chgData name="kheang ly" userId="0b0eb30075b8a81a" providerId="LiveId" clId="{0F61687B-2F3F-47F8-8EB1-337DF2D05EEF}" dt="2023-09-26T16:47:32.526" v="4239" actId="20577"/>
+          <ac:spMkLst>
+            <pc:docMk/>
+            <pc:sldMk cId="1224539229" sldId="289"/>
+            <ac:spMk id="2" creationId="{5366957A-F718-3CBF-05E0-59417ACEB6A8}"/>
+          </ac:spMkLst>
+        </pc:spChg>
+        <pc:spChg chg="mod">
+          <ac:chgData name="kheang ly" userId="0b0eb30075b8a81a" providerId="LiveId" clId="{0F61687B-2F3F-47F8-8EB1-337DF2D05EEF}" dt="2023-09-26T16:39:17.842" v="3617" actId="20577"/>
+          <ac:spMkLst>
+            <pc:docMk/>
+            <pc:sldMk cId="1224539229" sldId="289"/>
+            <ac:spMk id="3" creationId="{D3703452-55C6-BCCE-67D3-D23003ECAFC6}"/>
+          </ac:spMkLst>
+        </pc:spChg>
+        <pc:picChg chg="del">
+          <ac:chgData name="kheang ly" userId="0b0eb30075b8a81a" providerId="LiveId" clId="{0F61687B-2F3F-47F8-8EB1-337DF2D05EEF}" dt="2023-09-26T16:39:04.676" v="3614" actId="478"/>
+          <ac:picMkLst>
+            <pc:docMk/>
+            <pc:sldMk cId="1224539229" sldId="289"/>
+            <ac:picMk id="7" creationId="{26F87EE6-249B-FFEB-B903-3F54D0D4EA22}"/>
+          </ac:picMkLst>
+        </pc:picChg>
+      </pc:sldChg>
+      <pc:sldChg chg="delSp modSp add mod">
+        <pc:chgData name="kheang ly" userId="0b0eb30075b8a81a" providerId="LiveId" clId="{0F61687B-2F3F-47F8-8EB1-337DF2D05EEF}" dt="2023-09-26T16:48:21.349" v="4275" actId="1076"/>
+        <pc:sldMkLst>
+          <pc:docMk/>
+          <pc:sldMk cId="1898887618" sldId="290"/>
+        </pc:sldMkLst>
+        <pc:spChg chg="del">
+          <ac:chgData name="kheang ly" userId="0b0eb30075b8a81a" providerId="LiveId" clId="{0F61687B-2F3F-47F8-8EB1-337DF2D05EEF}" dt="2023-09-26T16:47:50.245" v="4241" actId="478"/>
+          <ac:spMkLst>
+            <pc:docMk/>
+            <pc:sldMk cId="1898887618" sldId="290"/>
+            <ac:spMk id="2" creationId="{5366957A-F718-3CBF-05E0-59417ACEB6A8}"/>
+          </ac:spMkLst>
+        </pc:spChg>
+        <pc:spChg chg="mod">
+          <ac:chgData name="kheang ly" userId="0b0eb30075b8a81a" providerId="LiveId" clId="{0F61687B-2F3F-47F8-8EB1-337DF2D05EEF}" dt="2023-09-26T16:48:21.349" v="4275" actId="1076"/>
+          <ac:spMkLst>
+            <pc:docMk/>
+            <pc:sldMk cId="1898887618" sldId="290"/>
+            <ac:spMk id="3" creationId="{D3703452-55C6-BCCE-67D3-D23003ECAFC6}"/>
+          </ac:spMkLst>
+        </pc:spChg>
+      </pc:sldChg>
+      <pc:sldChg chg="modSp add mod">
+        <pc:chgData name="kheang ly" userId="0b0eb30075b8a81a" providerId="LiveId" clId="{0F61687B-2F3F-47F8-8EB1-337DF2D05EEF}" dt="2023-09-26T16:49:16.728" v="4312" actId="1076"/>
+        <pc:sldMkLst>
+          <pc:docMk/>
+          <pc:sldMk cId="2949544485" sldId="291"/>
+        </pc:sldMkLst>
+        <pc:spChg chg="mod">
+          <ac:chgData name="kheang ly" userId="0b0eb30075b8a81a" providerId="LiveId" clId="{0F61687B-2F3F-47F8-8EB1-337DF2D05EEF}" dt="2023-09-26T16:49:16.728" v="4312" actId="1076"/>
+          <ac:spMkLst>
+            <pc:docMk/>
+            <pc:sldMk cId="2949544485" sldId="291"/>
+            <ac:spMk id="3" creationId="{D3703452-55C6-BCCE-67D3-D23003ECAFC6}"/>
+          </ac:spMkLst>
+        </pc:spChg>
       </pc:sldChg>
     </pc:docChg>
   </pc:docChgLst>
@@ -6501,8 +6682,8 @@
         </p:nvSpPr>
         <p:spPr>
           <a:xfrm>
-            <a:off x="3957799" y="1769769"/>
-            <a:ext cx="7892079" cy="1508105"/>
+            <a:off x="4041646" y="1165006"/>
+            <a:ext cx="7892079" cy="4216539"/>
           </a:xfrm>
           <a:prstGeom prst="rect">
             <a:avLst/>
@@ -6531,14 +6712,14 @@
               <a:t>អ្វីជា</a:t>
             </a:r>
             <a:r>
-              <a:rPr lang="en-US" sz="4400" b="1">
+              <a:rPr lang="en-US" sz="4400" b="1" dirty="0">
                 <a:latin typeface="Khmer OS Siemreap" panose="02000500000000020004" pitchFamily="2" charset="0"/>
                 <a:cs typeface="Khmer OS Siemreap" panose="02000500000000020004" pitchFamily="2" charset="0"/>
               </a:rPr>
               <a:t> Comments</a:t>
             </a:r>
             <a:r>
-              <a:rPr lang="km-KH" sz="4400" b="1">
+              <a:rPr lang="km-KH" sz="4400" b="1" dirty="0">
                 <a:latin typeface="Khmer OS Siemreap" panose="02000500000000020004" pitchFamily="2" charset="0"/>
                 <a:cs typeface="Khmer OS Siemreap" panose="02000500000000020004" pitchFamily="2" charset="0"/>
               </a:rPr>
@@ -6551,6 +6732,62 @@
               </a:rPr>
               <a:t> HTML?</a:t>
             </a:r>
+          </a:p>
+          <a:p>
+            <a:pPr algn="ctr"/>
+            <a:endParaRPr lang="km-KH" sz="4400" b="1" dirty="0">
+              <a:latin typeface="Khmer OS Siemreap" panose="02000500000000020004" pitchFamily="2" charset="0"/>
+              <a:cs typeface="Khmer OS Siemreap" panose="02000500000000020004" pitchFamily="2" charset="0"/>
+            </a:endParaRPr>
+          </a:p>
+          <a:p>
+            <a:pPr algn="ctr"/>
+            <a:r>
+              <a:rPr lang="en-US" sz="4400" b="1" dirty="0">
+                <a:latin typeface="Khmer OS Siemreap" panose="02000500000000020004" pitchFamily="2" charset="0"/>
+                <a:cs typeface="Khmer OS Siemreap" panose="02000500000000020004" pitchFamily="2" charset="0"/>
+              </a:rPr>
+              <a:t>Comment </a:t>
+            </a:r>
+            <a:r>
+              <a:rPr lang="km-KH" sz="4400" b="1" dirty="0">
+                <a:latin typeface="Khmer OS Siemreap" panose="02000500000000020004" pitchFamily="2" charset="0"/>
+                <a:cs typeface="Khmer OS Siemreap" panose="02000500000000020004" pitchFamily="2" charset="0"/>
+              </a:rPr>
+              <a:t>គឺជា​ ឃ្លាសម្រាប់ធ្វើការកត់ចំណាំនូវ កូដ</a:t>
+            </a:r>
+            <a:r>
+              <a:rPr lang="en-US" sz="4400" b="1" dirty="0">
+                <a:latin typeface="Khmer OS Siemreap" panose="02000500000000020004" pitchFamily="2" charset="0"/>
+                <a:cs typeface="Khmer OS Siemreap" panose="02000500000000020004" pitchFamily="2" charset="0"/>
+              </a:rPr>
+              <a:t> </a:t>
+            </a:r>
+            <a:r>
+              <a:rPr lang="km-KH" sz="4400" b="1" dirty="0">
+                <a:latin typeface="Khmer OS Siemreap" panose="02000500000000020004" pitchFamily="2" charset="0"/>
+                <a:cs typeface="Khmer OS Siemreap" panose="02000500000000020004" pitchFamily="2" charset="0"/>
+              </a:rPr>
+              <a:t>នៃ </a:t>
+            </a:r>
+            <a:r>
+              <a:rPr lang="en-US" sz="4400" b="1" dirty="0">
+                <a:latin typeface="Khmer OS Siemreap" panose="02000500000000020004" pitchFamily="2" charset="0"/>
+                <a:cs typeface="Khmer OS Siemreap" panose="02000500000000020004" pitchFamily="2" charset="0"/>
+              </a:rPr>
+              <a:t>HTML </a:t>
+            </a:r>
+            <a:r>
+              <a:rPr lang="km-KH" sz="4400" b="1" dirty="0">
+                <a:latin typeface="Khmer OS Siemreap" panose="02000500000000020004" pitchFamily="2" charset="0"/>
+                <a:cs typeface="Khmer OS Siemreap" panose="02000500000000020004" pitchFamily="2" charset="0"/>
+              </a:rPr>
+              <a:t>ដោយមិនប៉ះពាល់ដល់លទ្ធិផលនៃ កូដ។</a:t>
+            </a:r>
+            <a:endParaRPr lang="en-US" sz="4400" b="1" dirty="0">
+              <a:latin typeface="Khmer OS Siemreap" panose="02000500000000020004" pitchFamily="2" charset="0"/>
+              <a:cs typeface="Khmer OS Siemreap" panose="02000500000000020004" pitchFamily="2" charset="0"/>
+            </a:endParaRPr>
           </a:p>
           <a:p>
             <a:pPr algn="ctr"/>
@@ -6768,8 +7005,8 @@
         </p:nvSpPr>
         <p:spPr>
           <a:xfrm>
-            <a:off x="3957799" y="1769769"/>
-            <a:ext cx="7892079" cy="1508105"/>
+            <a:off x="4041646" y="493310"/>
+            <a:ext cx="7892079" cy="5816977"/>
           </a:xfrm>
           <a:prstGeom prst="rect">
             <a:avLst/>
@@ -6791,33 +7028,132 @@
               <a:t>តើ</a:t>
             </a:r>
             <a:r>
+              <a:rPr lang="en-US" sz="4400" b="1" dirty="0">
+                <a:latin typeface="Khmer OS Siemreap" panose="02000500000000020004" pitchFamily="2" charset="0"/>
+                <a:cs typeface="Khmer OS Siemreap" panose="02000500000000020004" pitchFamily="2" charset="0"/>
+              </a:rPr>
+              <a:t> Style HTML </a:t>
+            </a:r>
+            <a:r>
               <a:rPr lang="km-KH" sz="4400" b="1" dirty="0">
                 <a:latin typeface="Khmer OS Siemreap" panose="02000500000000020004" pitchFamily="2" charset="0"/>
                 <a:cs typeface="Khmer OS Siemreap" panose="02000500000000020004" pitchFamily="2" charset="0"/>
               </a:rPr>
-              <a:t>អ្វីជា</a:t>
+              <a:t>អាចប្រើប្រាស់ បានដោយរបៀបណា</a:t>
             </a:r>
             <a:r>
               <a:rPr lang="en-US" sz="4400" b="1" dirty="0">
                 <a:latin typeface="Khmer OS Siemreap" panose="02000500000000020004" pitchFamily="2" charset="0"/>
                 <a:cs typeface="Khmer OS Siemreap" panose="02000500000000020004" pitchFamily="2" charset="0"/>
               </a:rPr>
-              <a:t> Color</a:t>
-            </a:r>
-            <a:r>
-              <a:rPr lang="km-KH" sz="4400" b="1" dirty="0">
-                <a:latin typeface="Khmer OS Siemreap" panose="02000500000000020004" pitchFamily="2" charset="0"/>
-                <a:cs typeface="Khmer OS Siemreap" panose="02000500000000020004" pitchFamily="2" charset="0"/>
-              </a:rPr>
-              <a:t> ក្នុង</a:t>
-            </a:r>
-            <a:r>
-              <a:rPr lang="en-US" sz="4400" b="1" dirty="0">
-                <a:latin typeface="Khmer OS Siemreap" panose="02000500000000020004" pitchFamily="2" charset="0"/>
-                <a:cs typeface="Khmer OS Siemreap" panose="02000500000000020004" pitchFamily="2" charset="0"/>
-              </a:rPr>
-              <a:t> HTML?</a:t>
-            </a:r>
+              <a:t>?</a:t>
+            </a:r>
+            <a:endParaRPr lang="km-KH" sz="4400" b="1" dirty="0">
+              <a:latin typeface="Khmer OS Siemreap" panose="02000500000000020004" pitchFamily="2" charset="0"/>
+              <a:cs typeface="Khmer OS Siemreap" panose="02000500000000020004" pitchFamily="2" charset="0"/>
+            </a:endParaRPr>
+          </a:p>
+          <a:p>
+            <a:pPr algn="ctr"/>
+            <a:endParaRPr lang="km-KH" sz="4400" b="1" dirty="0">
+              <a:latin typeface="Khmer OS Siemreap" panose="02000500000000020004" pitchFamily="2" charset="0"/>
+              <a:cs typeface="Khmer OS Siemreap" panose="02000500000000020004" pitchFamily="2" charset="0"/>
+            </a:endParaRPr>
+          </a:p>
+          <a:p>
+            <a:pPr algn="ctr">
+              <a:lnSpc>
+                <a:spcPct val="150000"/>
+              </a:lnSpc>
+            </a:pPr>
+            <a:r>
+              <a:rPr lang="en-US" sz="3200" b="1" dirty="0">
+                <a:latin typeface="Khmer OS Siemreap" panose="02000500000000020004" pitchFamily="2" charset="0"/>
+                <a:cs typeface="Khmer OS Siemreap" panose="02000500000000020004" pitchFamily="2" charset="0"/>
+              </a:rPr>
+              <a:t>Style </a:t>
+            </a:r>
+            <a:r>
+              <a:rPr lang="km-KH" sz="3200" b="1" dirty="0">
+                <a:latin typeface="Khmer OS Siemreap" panose="02000500000000020004" pitchFamily="2" charset="0"/>
+                <a:cs typeface="Khmer OS Siemreap" panose="02000500000000020004" pitchFamily="2" charset="0"/>
+              </a:rPr>
+              <a:t>ក្នុង </a:t>
+            </a:r>
+            <a:r>
+              <a:rPr lang="en-US" sz="3200" b="1" dirty="0">
+                <a:latin typeface="Khmer OS Siemreap" panose="02000500000000020004" pitchFamily="2" charset="0"/>
+                <a:cs typeface="Khmer OS Siemreap" panose="02000500000000020004" pitchFamily="2" charset="0"/>
+              </a:rPr>
+              <a:t>HTML </a:t>
+            </a:r>
+            <a:r>
+              <a:rPr lang="km-KH" sz="3200" b="1" dirty="0">
+                <a:latin typeface="Khmer OS Siemreap" panose="02000500000000020004" pitchFamily="2" charset="0"/>
+                <a:cs typeface="Khmer OS Siemreap" panose="02000500000000020004" pitchFamily="2" charset="0"/>
+              </a:rPr>
+              <a:t>អាចប្រើប្រាស់បានដោយវិធីសាស្រ្ត សសេរ</a:t>
+            </a:r>
+            <a:r>
+              <a:rPr lang="en-US" sz="3200" b="1" dirty="0">
+                <a:latin typeface="Khmer OS Siemreap" panose="02000500000000020004" pitchFamily="2" charset="0"/>
+                <a:cs typeface="Khmer OS Siemreap" panose="02000500000000020004" pitchFamily="2" charset="0"/>
+              </a:rPr>
+              <a:t> CSS </a:t>
+            </a:r>
+            <a:r>
+              <a:rPr lang="km-KH" sz="3200" b="1" dirty="0">
+                <a:latin typeface="Khmer OS Siemreap" panose="02000500000000020004" pitchFamily="2" charset="0"/>
+                <a:cs typeface="Khmer OS Siemreap" panose="02000500000000020004" pitchFamily="2" charset="0"/>
+              </a:rPr>
+              <a:t>ក្នុង </a:t>
+            </a:r>
+            <a:r>
+              <a:rPr lang="en-US" sz="3200" b="1" dirty="0">
+                <a:latin typeface="Khmer OS Siemreap" panose="02000500000000020004" pitchFamily="2" charset="0"/>
+                <a:cs typeface="Khmer OS Siemreap" panose="02000500000000020004" pitchFamily="2" charset="0"/>
+              </a:rPr>
+              <a:t>Attribute Style </a:t>
+            </a:r>
+            <a:r>
+              <a:rPr lang="km-KH" sz="3200" b="1" dirty="0">
+                <a:latin typeface="Khmer OS Siemreap" panose="02000500000000020004" pitchFamily="2" charset="0"/>
+                <a:cs typeface="Khmer OS Siemreap" panose="02000500000000020004" pitchFamily="2" charset="0"/>
+              </a:rPr>
+              <a:t>នៅក្នុង </a:t>
+            </a:r>
+            <a:r>
+              <a:rPr lang="en-US" sz="3200" b="1" dirty="0">
+                <a:latin typeface="Khmer OS Siemreap" panose="02000500000000020004" pitchFamily="2" charset="0"/>
+                <a:cs typeface="Khmer OS Siemreap" panose="02000500000000020004" pitchFamily="2" charset="0"/>
+              </a:rPr>
+              <a:t>element </a:t>
+            </a:r>
+            <a:r>
+              <a:rPr lang="km-KH" sz="3200" b="1" dirty="0">
+                <a:latin typeface="Khmer OS Siemreap" panose="02000500000000020004" pitchFamily="2" charset="0"/>
+                <a:cs typeface="Khmer OS Siemreap" panose="02000500000000020004" pitchFamily="2" charset="0"/>
+              </a:rPr>
+              <a:t>ឬតាមរយៈការហៅចេញពី </a:t>
+            </a:r>
+            <a:r>
+              <a:rPr lang="en-US" sz="3200" b="1" dirty="0">
+                <a:latin typeface="Khmer OS Siemreap" panose="02000500000000020004" pitchFamily="2" charset="0"/>
+                <a:cs typeface="Khmer OS Siemreap" panose="02000500000000020004" pitchFamily="2" charset="0"/>
+              </a:rPr>
+              <a:t>Script Library </a:t>
+            </a:r>
+            <a:r>
+              <a:rPr lang="km-KH" sz="3200" b="1" dirty="0">
+                <a:latin typeface="Khmer OS Siemreap" panose="02000500000000020004" pitchFamily="2" charset="0"/>
+                <a:cs typeface="Khmer OS Siemreap" panose="02000500000000020004" pitchFamily="2" charset="0"/>
+              </a:rPr>
+              <a:t>ណាមួយ។</a:t>
+            </a:r>
+            <a:endParaRPr lang="en-US" sz="3200" b="1" dirty="0">
+              <a:latin typeface="Khmer OS Siemreap" panose="02000500000000020004" pitchFamily="2" charset="0"/>
+              <a:cs typeface="Khmer OS Siemreap" panose="02000500000000020004" pitchFamily="2" charset="0"/>
+            </a:endParaRPr>
           </a:p>
           <a:p>
             <a:pPr algn="ctr"/>
@@ -7158,8 +7494,8 @@
         </p:nvSpPr>
         <p:spPr>
           <a:xfrm>
-            <a:off x="3957799" y="1769769"/>
-            <a:ext cx="7892079" cy="1508105"/>
+            <a:off x="4041646" y="871691"/>
+            <a:ext cx="7892079" cy="4216539"/>
           </a:xfrm>
           <a:prstGeom prst="rect">
             <a:avLst/>
@@ -7185,28 +7521,42 @@
                 <a:latin typeface="Khmer OS Siemreap" panose="02000500000000020004" pitchFamily="2" charset="0"/>
                 <a:cs typeface="Khmer OS Siemreap" panose="02000500000000020004" pitchFamily="2" charset="0"/>
               </a:rPr>
-              <a:t>អ្វីជា</a:t>
+              <a:t>ការដាក់ </a:t>
             </a:r>
             <a:r>
               <a:rPr lang="en-US" sz="4400" b="1" dirty="0">
                 <a:latin typeface="Khmer OS Siemreap" panose="02000500000000020004" pitchFamily="2" charset="0"/>
                 <a:cs typeface="Khmer OS Siemreap" panose="02000500000000020004" pitchFamily="2" charset="0"/>
               </a:rPr>
-              <a:t> Images</a:t>
+              <a:t>Links </a:t>
             </a:r>
             <a:r>
               <a:rPr lang="km-KH" sz="4400" b="1" dirty="0">
                 <a:latin typeface="Khmer OS Siemreap" panose="02000500000000020004" pitchFamily="2" charset="0"/>
                 <a:cs typeface="Khmer OS Siemreap" panose="02000500000000020004" pitchFamily="2" charset="0"/>
               </a:rPr>
-              <a:t> ក្នុង</a:t>
+              <a:t>ក្នុង</a:t>
             </a:r>
             <a:r>
               <a:rPr lang="en-US" sz="4400" b="1" dirty="0">
                 <a:latin typeface="Khmer OS Siemreap" panose="02000500000000020004" pitchFamily="2" charset="0"/>
                 <a:cs typeface="Khmer OS Siemreap" panose="02000500000000020004" pitchFamily="2" charset="0"/>
               </a:rPr>
-              <a:t> HTML?</a:t>
+              <a:t> HTML</a:t>
+            </a:r>
+            <a:r>
+              <a:rPr lang="km-KH" sz="4400" b="1" dirty="0">
+                <a:latin typeface="Khmer OS Siemreap" panose="02000500000000020004" pitchFamily="2" charset="0"/>
+                <a:cs typeface="Khmer OS Siemreap" panose="02000500000000020004" pitchFamily="2" charset="0"/>
+              </a:rPr>
+              <a:t> ត្រូវធ្វើដោយ​របៀបណា</a:t>
+            </a:r>
+            <a:r>
+              <a:rPr lang="en-US" sz="4400" b="1" dirty="0">
+                <a:latin typeface="Khmer OS Siemreap" panose="02000500000000020004" pitchFamily="2" charset="0"/>
+                <a:cs typeface="Khmer OS Siemreap" panose="02000500000000020004" pitchFamily="2" charset="0"/>
+              </a:rPr>
+              <a:t>?</a:t>
             </a:r>
           </a:p>
           <a:p>
@@ -7216,12 +7566,64 @@
               <a:cs typeface="Khmer OS Siemreap" panose="02000500000000020004" pitchFamily="2" charset="0"/>
             </a:endParaRPr>
           </a:p>
+          <a:p>
+            <a:pPr algn="ctr"/>
+            <a:r>
+              <a:rPr lang="km-KH" sz="4400" b="1" dirty="0">
+                <a:latin typeface="Khmer OS Siemreap" panose="02000500000000020004" pitchFamily="2" charset="0"/>
+                <a:cs typeface="Khmer OS Siemreap" panose="02000500000000020004" pitchFamily="2" charset="0"/>
+              </a:rPr>
+              <a:t>យើងអាចធ្វើការដាក់ </a:t>
+            </a:r>
+            <a:r>
+              <a:rPr lang="en-US" sz="4400" b="1" dirty="0">
+                <a:latin typeface="Khmer OS Siemreap" panose="02000500000000020004" pitchFamily="2" charset="0"/>
+                <a:cs typeface="Khmer OS Siemreap" panose="02000500000000020004" pitchFamily="2" charset="0"/>
+              </a:rPr>
+              <a:t>Links</a:t>
+            </a:r>
+            <a:r>
+              <a:rPr lang="km-KH" sz="4400" b="1" dirty="0">
+                <a:latin typeface="Khmer OS Siemreap" panose="02000500000000020004" pitchFamily="2" charset="0"/>
+                <a:cs typeface="Khmer OS Siemreap" panose="02000500000000020004" pitchFamily="2" charset="0"/>
+              </a:rPr>
+              <a:t> បានតាមរយៈការ​ប្រើប្រាសនូវ </a:t>
+            </a:r>
+          </a:p>
+          <a:p>
+            <a:pPr algn="ctr"/>
+            <a:r>
+              <a:rPr lang="en-US" sz="4400" b="1" dirty="0">
+                <a:latin typeface="Khmer OS Siemreap" panose="02000500000000020004" pitchFamily="2" charset="0"/>
+                <a:cs typeface="Khmer OS Siemreap" panose="02000500000000020004" pitchFamily="2" charset="0"/>
+              </a:rPr>
+              <a:t>&lt;a&gt;</a:t>
+            </a:r>
+            <a:r>
+              <a:rPr lang="km-KH" sz="4400" b="1" dirty="0">
+                <a:latin typeface="Khmer OS Siemreap" panose="02000500000000020004" pitchFamily="2" charset="0"/>
+                <a:cs typeface="Khmer OS Siemreap" panose="02000500000000020004" pitchFamily="2" charset="0"/>
+              </a:rPr>
+              <a:t>។</a:t>
+            </a:r>
+            <a:r>
+              <a:rPr lang="en-US" sz="4400" b="1" dirty="0">
+                <a:latin typeface="Khmer OS Siemreap" panose="02000500000000020004" pitchFamily="2" charset="0"/>
+                <a:cs typeface="Khmer OS Siemreap" panose="02000500000000020004" pitchFamily="2" charset="0"/>
+              </a:rPr>
+              <a:t> </a:t>
+            </a:r>
+            <a:endParaRPr lang="km-KH" sz="4400" b="1" dirty="0">
+              <a:latin typeface="Khmer OS Siemreap" panose="02000500000000020004" pitchFamily="2" charset="0"/>
+              <a:cs typeface="Khmer OS Siemreap" panose="02000500000000020004" pitchFamily="2" charset="0"/>
+            </a:endParaRPr>
+          </a:p>
         </p:txBody>
       </p:sp>
     </p:spTree>
     <p:extLst>
       <p:ext uri="{BB962C8B-B14F-4D97-AF65-F5344CB8AC3E}">
-        <p14:creationId xmlns:p14="http://schemas.microsoft.com/office/powerpoint/2010/main" val="3649901522"/>
+        <p14:creationId xmlns:p14="http://schemas.microsoft.com/office/powerpoint/2010/main" val="1189373135"/>
       </p:ext>
     </p:extLst>
   </p:cSld>
@@ -7337,7 +7739,7 @@
     </p:spTree>
     <p:extLst>
       <p:ext uri="{BB962C8B-B14F-4D97-AF65-F5344CB8AC3E}">
-        <p14:creationId xmlns:p14="http://schemas.microsoft.com/office/powerpoint/2010/main" val="1301531918"/>
+        <p14:creationId xmlns:p14="http://schemas.microsoft.com/office/powerpoint/2010/main" val="1113286957"/>
       </p:ext>
     </p:extLst>
   </p:cSld>
@@ -7425,8 +7827,8 @@
         </p:nvSpPr>
         <p:spPr>
           <a:xfrm>
-            <a:off x="3957799" y="1769769"/>
-            <a:ext cx="7892079" cy="1508105"/>
+            <a:off x="4041646" y="677162"/>
+            <a:ext cx="7892079" cy="4216539"/>
           </a:xfrm>
           <a:prstGeom prst="rect">
             <a:avLst/>
@@ -7452,28 +7854,56 @@
                 <a:latin typeface="Khmer OS Siemreap" panose="02000500000000020004" pitchFamily="2" charset="0"/>
                 <a:cs typeface="Khmer OS Siemreap" panose="02000500000000020004" pitchFamily="2" charset="0"/>
               </a:rPr>
-              <a:t>អ្វីជា</a:t>
+              <a:t>ការដាក់ រូបភាព</a:t>
             </a:r>
             <a:r>
               <a:rPr lang="en-US" sz="4400" b="1" dirty="0">
                 <a:latin typeface="Khmer OS Siemreap" panose="02000500000000020004" pitchFamily="2" charset="0"/>
                 <a:cs typeface="Khmer OS Siemreap" panose="02000500000000020004" pitchFamily="2" charset="0"/>
               </a:rPr>
-              <a:t> Table</a:t>
+              <a:t> </a:t>
             </a:r>
             <a:r>
               <a:rPr lang="km-KH" sz="4400" b="1" dirty="0">
                 <a:latin typeface="Khmer OS Siemreap" panose="02000500000000020004" pitchFamily="2" charset="0"/>
                 <a:cs typeface="Khmer OS Siemreap" panose="02000500000000020004" pitchFamily="2" charset="0"/>
               </a:rPr>
-              <a:t> ក្នុង</a:t>
+              <a:t>(</a:t>
             </a:r>
             <a:r>
               <a:rPr lang="en-US" sz="4400" b="1" dirty="0">
                 <a:latin typeface="Khmer OS Siemreap" panose="02000500000000020004" pitchFamily="2" charset="0"/>
                 <a:cs typeface="Khmer OS Siemreap" panose="02000500000000020004" pitchFamily="2" charset="0"/>
               </a:rPr>
-              <a:t> HTML?</a:t>
+              <a:t>Images</a:t>
+            </a:r>
+            <a:r>
+              <a:rPr lang="km-KH" sz="4400" b="1" dirty="0">
+                <a:latin typeface="Khmer OS Siemreap" panose="02000500000000020004" pitchFamily="2" charset="0"/>
+                <a:cs typeface="Khmer OS Siemreap" panose="02000500000000020004" pitchFamily="2" charset="0"/>
+              </a:rPr>
+              <a:t>) ក្នុង</a:t>
+            </a:r>
+            <a:r>
+              <a:rPr lang="en-US" sz="4400" b="1" dirty="0">
+                <a:latin typeface="Khmer OS Siemreap" panose="02000500000000020004" pitchFamily="2" charset="0"/>
+                <a:cs typeface="Khmer OS Siemreap" panose="02000500000000020004" pitchFamily="2" charset="0"/>
+              </a:rPr>
+              <a:t> HTML</a:t>
+            </a:r>
+            <a:r>
+              <a:rPr lang="km-KH" sz="4400" b="1" dirty="0">
+                <a:latin typeface="Khmer OS Siemreap" panose="02000500000000020004" pitchFamily="2" charset="0"/>
+                <a:cs typeface="Khmer OS Siemreap" panose="02000500000000020004" pitchFamily="2" charset="0"/>
+              </a:rPr>
+              <a:t> ត្រូវធ្វើដោយ​របៀបណា</a:t>
+            </a:r>
+            <a:r>
+              <a:rPr lang="en-US" sz="4400" b="1" dirty="0">
+                <a:latin typeface="Khmer OS Siemreap" panose="02000500000000020004" pitchFamily="2" charset="0"/>
+                <a:cs typeface="Khmer OS Siemreap" panose="02000500000000020004" pitchFamily="2" charset="0"/>
+              </a:rPr>
+              <a:t>?</a:t>
             </a:r>
           </a:p>
           <a:p>
@@ -7483,12 +7913,78 @@
               <a:cs typeface="Khmer OS Siemreap" panose="02000500000000020004" pitchFamily="2" charset="0"/>
             </a:endParaRPr>
           </a:p>
+          <a:p>
+            <a:pPr algn="ctr"/>
+            <a:r>
+              <a:rPr lang="km-KH" sz="4400" b="1" dirty="0">
+                <a:latin typeface="Khmer OS Siemreap" panose="02000500000000020004" pitchFamily="2" charset="0"/>
+                <a:cs typeface="Khmer OS Siemreap" panose="02000500000000020004" pitchFamily="2" charset="0"/>
+              </a:rPr>
+              <a:t>យើងអាចធ្វើការដាក់ </a:t>
+            </a:r>
+            <a:r>
+              <a:rPr lang="en-US" sz="4400" b="1" dirty="0">
+                <a:latin typeface="Khmer OS Siemreap" panose="02000500000000020004" pitchFamily="2" charset="0"/>
+                <a:cs typeface="Khmer OS Siemreap" panose="02000500000000020004" pitchFamily="2" charset="0"/>
+              </a:rPr>
+              <a:t>images</a:t>
+            </a:r>
+            <a:r>
+              <a:rPr lang="km-KH" sz="4400" b="1" dirty="0">
+                <a:latin typeface="Khmer OS Siemreap" panose="02000500000000020004" pitchFamily="2" charset="0"/>
+                <a:cs typeface="Khmer OS Siemreap" panose="02000500000000020004" pitchFamily="2" charset="0"/>
+              </a:rPr>
+              <a:t> បានតាមរយៈការ​ប្រើប្រាសនូវ </a:t>
+            </a:r>
+          </a:p>
+          <a:p>
+            <a:pPr algn="ctr"/>
+            <a:r>
+              <a:rPr lang="en-US" sz="4400" b="1" dirty="0">
+                <a:latin typeface="Khmer OS Siemreap" panose="02000500000000020004" pitchFamily="2" charset="0"/>
+                <a:cs typeface="Khmer OS Siemreap" panose="02000500000000020004" pitchFamily="2" charset="0"/>
+              </a:rPr>
+              <a:t>&lt;</a:t>
+            </a:r>
+            <a:r>
+              <a:rPr lang="en-US" sz="4400" b="1" dirty="0" err="1">
+                <a:latin typeface="Khmer OS Siemreap" panose="02000500000000020004" pitchFamily="2" charset="0"/>
+                <a:cs typeface="Khmer OS Siemreap" panose="02000500000000020004" pitchFamily="2" charset="0"/>
+              </a:rPr>
+              <a:t>img</a:t>
+            </a:r>
+            <a:r>
+              <a:rPr lang="en-US" sz="4400" b="1" dirty="0">
+                <a:latin typeface="Khmer OS Siemreap" panose="02000500000000020004" pitchFamily="2" charset="0"/>
+                <a:cs typeface="Khmer OS Siemreap" panose="02000500000000020004" pitchFamily="2" charset="0"/>
+              </a:rPr>
+              <a:t>&gt;</a:t>
+            </a:r>
+            <a:r>
+              <a:rPr lang="km-KH" sz="4400" b="1" dirty="0">
+                <a:latin typeface="Khmer OS Siemreap" panose="02000500000000020004" pitchFamily="2" charset="0"/>
+                <a:cs typeface="Khmer OS Siemreap" panose="02000500000000020004" pitchFamily="2" charset="0"/>
+              </a:rPr>
+              <a:t>។</a:t>
+            </a:r>
+            <a:r>
+              <a:rPr lang="en-US" sz="4400" b="1" dirty="0">
+                <a:latin typeface="Khmer OS Siemreap" panose="02000500000000020004" pitchFamily="2" charset="0"/>
+                <a:cs typeface="Khmer OS Siemreap" panose="02000500000000020004" pitchFamily="2" charset="0"/>
+              </a:rPr>
+              <a:t> </a:t>
+            </a:r>
+            <a:endParaRPr lang="km-KH" sz="4400" b="1" dirty="0">
+              <a:latin typeface="Khmer OS Siemreap" panose="02000500000000020004" pitchFamily="2" charset="0"/>
+              <a:cs typeface="Khmer OS Siemreap" panose="02000500000000020004" pitchFamily="2" charset="0"/>
+            </a:endParaRPr>
+          </a:p>
         </p:txBody>
       </p:sp>
     </p:spTree>
     <p:extLst>
       <p:ext uri="{BB962C8B-B14F-4D97-AF65-F5344CB8AC3E}">
-        <p14:creationId xmlns:p14="http://schemas.microsoft.com/office/powerpoint/2010/main" val="4004303302"/>
+        <p14:creationId xmlns:p14="http://schemas.microsoft.com/office/powerpoint/2010/main" val="3649901522"/>
       </p:ext>
     </p:extLst>
   </p:cSld>
@@ -7604,7 +8100,7 @@
     </p:spTree>
     <p:extLst>
       <p:ext uri="{BB962C8B-B14F-4D97-AF65-F5344CB8AC3E}">
-        <p14:creationId xmlns:p14="http://schemas.microsoft.com/office/powerpoint/2010/main" val="3784241961"/>
+        <p14:creationId xmlns:p14="http://schemas.microsoft.com/office/powerpoint/2010/main" val="1301531918"/>
       </p:ext>
     </p:extLst>
   </p:cSld>
@@ -7692,8 +8188,8 @@
         </p:nvSpPr>
         <p:spPr>
           <a:xfrm>
-            <a:off x="3957799" y="1769769"/>
-            <a:ext cx="7892079" cy="1508105"/>
+            <a:off x="4041646" y="677162"/>
+            <a:ext cx="7892079" cy="4216539"/>
           </a:xfrm>
           <a:prstGeom prst="rect">
             <a:avLst/>
@@ -7719,28 +8215,56 @@
                 <a:latin typeface="Khmer OS Siemreap" panose="02000500000000020004" pitchFamily="2" charset="0"/>
                 <a:cs typeface="Khmer OS Siemreap" panose="02000500000000020004" pitchFamily="2" charset="0"/>
               </a:rPr>
-              <a:t>អ្វីជា</a:t>
+              <a:t>ការដាក់ តារាង</a:t>
             </a:r>
             <a:r>
               <a:rPr lang="en-US" sz="4400" b="1" dirty="0">
                 <a:latin typeface="Khmer OS Siemreap" panose="02000500000000020004" pitchFamily="2" charset="0"/>
                 <a:cs typeface="Khmer OS Siemreap" panose="02000500000000020004" pitchFamily="2" charset="0"/>
               </a:rPr>
-              <a:t> Lists</a:t>
+              <a:t> </a:t>
             </a:r>
             <a:r>
               <a:rPr lang="km-KH" sz="4400" b="1" dirty="0">
                 <a:latin typeface="Khmer OS Siemreap" panose="02000500000000020004" pitchFamily="2" charset="0"/>
                 <a:cs typeface="Khmer OS Siemreap" panose="02000500000000020004" pitchFamily="2" charset="0"/>
               </a:rPr>
-              <a:t> ក្នុង</a:t>
+              <a:t>(</a:t>
             </a:r>
             <a:r>
               <a:rPr lang="en-US" sz="4400" b="1" dirty="0">
                 <a:latin typeface="Khmer OS Siemreap" panose="02000500000000020004" pitchFamily="2" charset="0"/>
                 <a:cs typeface="Khmer OS Siemreap" panose="02000500000000020004" pitchFamily="2" charset="0"/>
               </a:rPr>
-              <a:t> HTML?</a:t>
+              <a:t>Table</a:t>
+            </a:r>
+            <a:r>
+              <a:rPr lang="km-KH" sz="4400" b="1" dirty="0">
+                <a:latin typeface="Khmer OS Siemreap" panose="02000500000000020004" pitchFamily="2" charset="0"/>
+                <a:cs typeface="Khmer OS Siemreap" panose="02000500000000020004" pitchFamily="2" charset="0"/>
+              </a:rPr>
+              <a:t>) ក្នុង</a:t>
+            </a:r>
+            <a:r>
+              <a:rPr lang="en-US" sz="4400" b="1" dirty="0">
+                <a:latin typeface="Khmer OS Siemreap" panose="02000500000000020004" pitchFamily="2" charset="0"/>
+                <a:cs typeface="Khmer OS Siemreap" panose="02000500000000020004" pitchFamily="2" charset="0"/>
+              </a:rPr>
+              <a:t> HTML</a:t>
+            </a:r>
+            <a:r>
+              <a:rPr lang="km-KH" sz="4400" b="1" dirty="0">
+                <a:latin typeface="Khmer OS Siemreap" panose="02000500000000020004" pitchFamily="2" charset="0"/>
+                <a:cs typeface="Khmer OS Siemreap" panose="02000500000000020004" pitchFamily="2" charset="0"/>
+              </a:rPr>
+              <a:t> ត្រូវធ្វើដោយ​របៀបណា</a:t>
+            </a:r>
+            <a:r>
+              <a:rPr lang="en-US" sz="4400" b="1" dirty="0">
+                <a:latin typeface="Khmer OS Siemreap" panose="02000500000000020004" pitchFamily="2" charset="0"/>
+                <a:cs typeface="Khmer OS Siemreap" panose="02000500000000020004" pitchFamily="2" charset="0"/>
+              </a:rPr>
+              <a:t>?</a:t>
             </a:r>
           </a:p>
           <a:p>
@@ -7750,12 +8274,64 @@
               <a:cs typeface="Khmer OS Siemreap" panose="02000500000000020004" pitchFamily="2" charset="0"/>
             </a:endParaRPr>
           </a:p>
+          <a:p>
+            <a:pPr algn="ctr"/>
+            <a:r>
+              <a:rPr lang="km-KH" sz="4400" b="1" dirty="0">
+                <a:latin typeface="Khmer OS Siemreap" panose="02000500000000020004" pitchFamily="2" charset="0"/>
+                <a:cs typeface="Khmer OS Siemreap" panose="02000500000000020004" pitchFamily="2" charset="0"/>
+              </a:rPr>
+              <a:t>យើងអាចធ្វើការដាក់</a:t>
+            </a:r>
+            <a:r>
+              <a:rPr lang="en-US" sz="4400" b="1" dirty="0">
+                <a:latin typeface="Khmer OS Siemreap" panose="02000500000000020004" pitchFamily="2" charset="0"/>
+                <a:cs typeface="Khmer OS Siemreap" panose="02000500000000020004" pitchFamily="2" charset="0"/>
+              </a:rPr>
+              <a:t> Table </a:t>
+            </a:r>
+            <a:r>
+              <a:rPr lang="km-KH" sz="4400" b="1" dirty="0">
+                <a:latin typeface="Khmer OS Siemreap" panose="02000500000000020004" pitchFamily="2" charset="0"/>
+                <a:cs typeface="Khmer OS Siemreap" panose="02000500000000020004" pitchFamily="2" charset="0"/>
+              </a:rPr>
+              <a:t>បានតាមរយៈការ​ប្រើប្រាសនូវ </a:t>
+            </a:r>
+          </a:p>
+          <a:p>
+            <a:pPr algn="ctr"/>
+            <a:r>
+              <a:rPr lang="en-US" sz="4400" b="1" dirty="0">
+                <a:latin typeface="Khmer OS Siemreap" panose="02000500000000020004" pitchFamily="2" charset="0"/>
+                <a:cs typeface="Khmer OS Siemreap" panose="02000500000000020004" pitchFamily="2" charset="0"/>
+              </a:rPr>
+              <a:t>&lt;table&gt;</a:t>
+            </a:r>
+            <a:r>
+              <a:rPr lang="km-KH" sz="4400" b="1" dirty="0">
+                <a:latin typeface="Khmer OS Siemreap" panose="02000500000000020004" pitchFamily="2" charset="0"/>
+                <a:cs typeface="Khmer OS Siemreap" panose="02000500000000020004" pitchFamily="2" charset="0"/>
+              </a:rPr>
+              <a:t>។</a:t>
+            </a:r>
+            <a:r>
+              <a:rPr lang="en-US" sz="4400" b="1" dirty="0">
+                <a:latin typeface="Khmer OS Siemreap" panose="02000500000000020004" pitchFamily="2" charset="0"/>
+                <a:cs typeface="Khmer OS Siemreap" panose="02000500000000020004" pitchFamily="2" charset="0"/>
+              </a:rPr>
+              <a:t> </a:t>
+            </a:r>
+            <a:endParaRPr lang="km-KH" sz="4400" b="1" dirty="0">
+              <a:latin typeface="Khmer OS Siemreap" panose="02000500000000020004" pitchFamily="2" charset="0"/>
+              <a:cs typeface="Khmer OS Siemreap" panose="02000500000000020004" pitchFamily="2" charset="0"/>
+            </a:endParaRPr>
+          </a:p>
         </p:txBody>
       </p:sp>
     </p:spTree>
     <p:extLst>
       <p:ext uri="{BB962C8B-B14F-4D97-AF65-F5344CB8AC3E}">
-        <p14:creationId xmlns:p14="http://schemas.microsoft.com/office/powerpoint/2010/main" val="3282565304"/>
+        <p14:creationId xmlns:p14="http://schemas.microsoft.com/office/powerpoint/2010/main" val="3829970568"/>
       </p:ext>
     </p:extLst>
   </p:cSld>
@@ -7871,7 +8447,657 @@
     </p:spTree>
     <p:extLst>
       <p:ext uri="{BB962C8B-B14F-4D97-AF65-F5344CB8AC3E}">
+        <p14:creationId xmlns:p14="http://schemas.microsoft.com/office/powerpoint/2010/main" val="3784241961"/>
+      </p:ext>
+    </p:extLst>
+  </p:cSld>
+  <p:clrMapOvr>
+    <a:masterClrMapping/>
+  </p:clrMapOvr>
+</p:sld>
+</file>
+
+<file path=ppt/slides/slide26.xml><?xml version="1.0" encoding="utf-8"?>
+<p:sld xmlns:a="http://schemas.openxmlformats.org/drawingml/2006/main" xmlns:r="http://schemas.openxmlformats.org/officeDocument/2006/relationships" xmlns:p="http://schemas.openxmlformats.org/presentationml/2006/main">
+  <p:cSld>
+    <p:spTree>
+      <p:nvGrpSpPr>
+        <p:cNvPr id="1" name=""/>
+        <p:cNvGrpSpPr/>
+        <p:nvPr/>
+      </p:nvGrpSpPr>
+      <p:grpSpPr>
+        <a:xfrm>
+          <a:off x="0" y="0"/>
+          <a:ext cx="0" cy="0"/>
+          <a:chOff x="0" y="0"/>
+          <a:chExt cx="0" cy="0"/>
+        </a:xfrm>
+      </p:grpSpPr>
+      <p:pic>
+        <p:nvPicPr>
+          <p:cNvPr id="7" name="Picture 8" descr="Html 5 Detailed Flat Circular Flat icon">
+            <a:extLst>
+              <a:ext uri="{FF2B5EF4-FFF2-40B4-BE49-F238E27FC236}">
+                <a16:creationId xmlns:a16="http://schemas.microsoft.com/office/drawing/2014/main" id="{26F87EE6-249B-FFEB-B903-3F54D0D4EA22}"/>
+              </a:ext>
+            </a:extLst>
+          </p:cNvPr>
+          <p:cNvPicPr>
+            <a:picLocks noChangeAspect="1" noChangeArrowheads="1"/>
+          </p:cNvPicPr>
+          <p:nvPr/>
+        </p:nvPicPr>
+        <p:blipFill>
+          <a:blip r:embed="rId2">
+            <a:extLst>
+              <a:ext uri="{28A0092B-C50C-407E-A947-70E740481C1C}">
+                <a14:useLocalDpi xmlns:a14="http://schemas.microsoft.com/office/drawing/2010/main" val="0"/>
+              </a:ext>
+            </a:extLst>
+          </a:blip>
+          <a:srcRect/>
+          <a:stretch>
+            <a:fillRect/>
+          </a:stretch>
+        </p:blipFill>
+        <p:spPr bwMode="auto">
+          <a:xfrm>
+            <a:off x="723185" y="1769769"/>
+            <a:ext cx="3318461" cy="3318461"/>
+          </a:xfrm>
+          <a:prstGeom prst="rect">
+            <a:avLst/>
+          </a:prstGeom>
+          <a:noFill/>
+          <a:extLst>
+            <a:ext uri="{909E8E84-426E-40DD-AFC4-6F175D3DCCD1}">
+              <a14:hiddenFill xmlns:a14="http://schemas.microsoft.com/office/drawing/2010/main">
+                <a:solidFill>
+                  <a:srgbClr val="FFFFFF"/>
+                </a:solidFill>
+              </a14:hiddenFill>
+            </a:ext>
+          </a:extLst>
+        </p:spPr>
+      </p:pic>
+      <p:sp>
+        <p:nvSpPr>
+          <p:cNvPr id="2" name="TextBox 1">
+            <a:extLst>
+              <a:ext uri="{FF2B5EF4-FFF2-40B4-BE49-F238E27FC236}">
+                <a16:creationId xmlns:a16="http://schemas.microsoft.com/office/drawing/2014/main" id="{5366957A-F718-3CBF-05E0-59417ACEB6A8}"/>
+              </a:ext>
+            </a:extLst>
+          </p:cNvPr>
+          <p:cNvSpPr txBox="1"/>
+          <p:nvPr/>
+        </p:nvSpPr>
+        <p:spPr>
+          <a:xfrm>
+            <a:off x="4041646" y="677162"/>
+            <a:ext cx="7892079" cy="4216539"/>
+          </a:xfrm>
+          <a:prstGeom prst="rect">
+            <a:avLst/>
+          </a:prstGeom>
+          <a:noFill/>
+        </p:spPr>
+        <p:txBody>
+          <a:bodyPr wrap="square" rtlCol="0">
+            <a:spAutoFit/>
+          </a:bodyPr>
+          <a:lstStyle/>
+          <a:p>
+            <a:pPr algn="ctr"/>
+            <a:r>
+              <a:rPr lang="km-KH" sz="4800" b="1" dirty="0">
+                <a:latin typeface="Khmer OS Siemreap" panose="02000500000000020004" pitchFamily="2" charset="0"/>
+                <a:cs typeface="Khmer OS Siemreap" panose="02000500000000020004" pitchFamily="2" charset="0"/>
+              </a:rPr>
+              <a:t>តើ</a:t>
+            </a:r>
+            <a:r>
+              <a:rPr lang="km-KH" sz="4400" b="1" dirty="0">
+                <a:latin typeface="Khmer OS Siemreap" panose="02000500000000020004" pitchFamily="2" charset="0"/>
+                <a:cs typeface="Khmer OS Siemreap" panose="02000500000000020004" pitchFamily="2" charset="0"/>
+              </a:rPr>
+              <a:t>ការដាក់ </a:t>
+            </a:r>
+            <a:r>
+              <a:rPr lang="en-US" sz="4400" b="1" dirty="0">
+                <a:latin typeface="Khmer OS Siemreap" panose="02000500000000020004" pitchFamily="2" charset="0"/>
+                <a:cs typeface="Khmer OS Siemreap" panose="02000500000000020004" pitchFamily="2" charset="0"/>
+              </a:rPr>
+              <a:t>Lists</a:t>
+            </a:r>
+            <a:r>
+              <a:rPr lang="km-KH" sz="4400" b="1" dirty="0">
+                <a:latin typeface="Khmer OS Siemreap" panose="02000500000000020004" pitchFamily="2" charset="0"/>
+                <a:cs typeface="Khmer OS Siemreap" panose="02000500000000020004" pitchFamily="2" charset="0"/>
+              </a:rPr>
+              <a:t> ក្នុង</a:t>
+            </a:r>
+            <a:r>
+              <a:rPr lang="en-US" sz="4400" b="1" dirty="0">
+                <a:latin typeface="Khmer OS Siemreap" panose="02000500000000020004" pitchFamily="2" charset="0"/>
+                <a:cs typeface="Khmer OS Siemreap" panose="02000500000000020004" pitchFamily="2" charset="0"/>
+              </a:rPr>
+              <a:t> HTML</a:t>
+            </a:r>
+            <a:r>
+              <a:rPr lang="km-KH" sz="4400" b="1" dirty="0">
+                <a:latin typeface="Khmer OS Siemreap" panose="02000500000000020004" pitchFamily="2" charset="0"/>
+                <a:cs typeface="Khmer OS Siemreap" panose="02000500000000020004" pitchFamily="2" charset="0"/>
+              </a:rPr>
+              <a:t> ត្រូវធ្វើដោយ​របៀបណា</a:t>
+            </a:r>
+            <a:r>
+              <a:rPr lang="en-US" sz="4400" b="1" dirty="0">
+                <a:latin typeface="Khmer OS Siemreap" panose="02000500000000020004" pitchFamily="2" charset="0"/>
+                <a:cs typeface="Khmer OS Siemreap" panose="02000500000000020004" pitchFamily="2" charset="0"/>
+              </a:rPr>
+              <a:t>?</a:t>
+            </a:r>
+          </a:p>
+          <a:p>
+            <a:pPr algn="ctr"/>
+            <a:endParaRPr lang="km-KH" sz="4400" b="1" dirty="0">
+              <a:latin typeface="Khmer OS Siemreap" panose="02000500000000020004" pitchFamily="2" charset="0"/>
+              <a:cs typeface="Khmer OS Siemreap" panose="02000500000000020004" pitchFamily="2" charset="0"/>
+            </a:endParaRPr>
+          </a:p>
+          <a:p>
+            <a:pPr algn="ctr"/>
+            <a:r>
+              <a:rPr lang="km-KH" sz="4400" b="1" dirty="0">
+                <a:latin typeface="Khmer OS Siemreap" panose="02000500000000020004" pitchFamily="2" charset="0"/>
+                <a:cs typeface="Khmer OS Siemreap" panose="02000500000000020004" pitchFamily="2" charset="0"/>
+              </a:rPr>
+              <a:t>យើងអាចធ្វើការដាក់</a:t>
+            </a:r>
+            <a:r>
+              <a:rPr lang="en-US" sz="4400" b="1" dirty="0">
+                <a:latin typeface="Khmer OS Siemreap" panose="02000500000000020004" pitchFamily="2" charset="0"/>
+                <a:cs typeface="Khmer OS Siemreap" panose="02000500000000020004" pitchFamily="2" charset="0"/>
+              </a:rPr>
+              <a:t> lists</a:t>
+            </a:r>
+            <a:r>
+              <a:rPr lang="km-KH" sz="4400" b="1" dirty="0">
+                <a:latin typeface="Khmer OS Siemreap" panose="02000500000000020004" pitchFamily="2" charset="0"/>
+                <a:cs typeface="Khmer OS Siemreap" panose="02000500000000020004" pitchFamily="2" charset="0"/>
+              </a:rPr>
+              <a:t>បានតាមរយៈការ​ប្រើប្រាសនូវ </a:t>
+            </a:r>
+          </a:p>
+          <a:p>
+            <a:pPr algn="ctr"/>
+            <a:r>
+              <a:rPr lang="en-US" sz="4400" b="1" dirty="0">
+                <a:latin typeface="Khmer OS Siemreap" panose="02000500000000020004" pitchFamily="2" charset="0"/>
+                <a:cs typeface="Khmer OS Siemreap" panose="02000500000000020004" pitchFamily="2" charset="0"/>
+              </a:rPr>
+              <a:t>&lt;</a:t>
+            </a:r>
+            <a:r>
+              <a:rPr lang="en-US" sz="4400" b="1" dirty="0" err="1">
+                <a:latin typeface="Khmer OS Siemreap" panose="02000500000000020004" pitchFamily="2" charset="0"/>
+                <a:cs typeface="Khmer OS Siemreap" panose="02000500000000020004" pitchFamily="2" charset="0"/>
+              </a:rPr>
+              <a:t>ul</a:t>
+            </a:r>
+            <a:r>
+              <a:rPr lang="en-US" sz="4400" b="1" dirty="0">
+                <a:latin typeface="Khmer OS Siemreap" panose="02000500000000020004" pitchFamily="2" charset="0"/>
+                <a:cs typeface="Khmer OS Siemreap" panose="02000500000000020004" pitchFamily="2" charset="0"/>
+              </a:rPr>
+              <a:t>&gt;, &lt;</a:t>
+            </a:r>
+            <a:r>
+              <a:rPr lang="en-US" sz="4400" b="1" dirty="0" err="1">
+                <a:latin typeface="Khmer OS Siemreap" panose="02000500000000020004" pitchFamily="2" charset="0"/>
+                <a:cs typeface="Khmer OS Siemreap" panose="02000500000000020004" pitchFamily="2" charset="0"/>
+              </a:rPr>
+              <a:t>ol</a:t>
+            </a:r>
+            <a:r>
+              <a:rPr lang="en-US" sz="4400" b="1" dirty="0">
+                <a:latin typeface="Khmer OS Siemreap" panose="02000500000000020004" pitchFamily="2" charset="0"/>
+                <a:cs typeface="Khmer OS Siemreap" panose="02000500000000020004" pitchFamily="2" charset="0"/>
+              </a:rPr>
+              <a:t>&gt;,…</a:t>
+            </a:r>
+            <a:r>
+              <a:rPr lang="km-KH" sz="4400" b="1" dirty="0">
+                <a:latin typeface="Khmer OS Siemreap" panose="02000500000000020004" pitchFamily="2" charset="0"/>
+                <a:cs typeface="Khmer OS Siemreap" panose="02000500000000020004" pitchFamily="2" charset="0"/>
+              </a:rPr>
+              <a:t>។</a:t>
+            </a:r>
+            <a:r>
+              <a:rPr lang="en-US" sz="4400" b="1" dirty="0">
+                <a:latin typeface="Khmer OS Siemreap" panose="02000500000000020004" pitchFamily="2" charset="0"/>
+                <a:cs typeface="Khmer OS Siemreap" panose="02000500000000020004" pitchFamily="2" charset="0"/>
+              </a:rPr>
+              <a:t> </a:t>
+            </a:r>
+            <a:endParaRPr lang="km-KH" sz="4400" b="1" dirty="0">
+              <a:latin typeface="Khmer OS Siemreap" panose="02000500000000020004" pitchFamily="2" charset="0"/>
+              <a:cs typeface="Khmer OS Siemreap" panose="02000500000000020004" pitchFamily="2" charset="0"/>
+            </a:endParaRPr>
+          </a:p>
+        </p:txBody>
+      </p:sp>
+    </p:spTree>
+    <p:extLst>
+      <p:ext uri="{BB962C8B-B14F-4D97-AF65-F5344CB8AC3E}">
+        <p14:creationId xmlns:p14="http://schemas.microsoft.com/office/powerpoint/2010/main" val="2978452678"/>
+      </p:ext>
+    </p:extLst>
+  </p:cSld>
+  <p:clrMapOvr>
+    <a:masterClrMapping/>
+  </p:clrMapOvr>
+</p:sld>
+</file>
+
+<file path=ppt/slides/slide27.xml><?xml version="1.0" encoding="utf-8"?>
+<p:sld xmlns:a="http://schemas.openxmlformats.org/drawingml/2006/main" xmlns:r="http://schemas.openxmlformats.org/officeDocument/2006/relationships" xmlns:p="http://schemas.openxmlformats.org/presentationml/2006/main">
+  <p:cSld>
+    <p:spTree>
+      <p:nvGrpSpPr>
+        <p:cNvPr id="1" name=""/>
+        <p:cNvGrpSpPr/>
+        <p:nvPr/>
+      </p:nvGrpSpPr>
+      <p:grpSpPr>
+        <a:xfrm>
+          <a:off x="0" y="0"/>
+          <a:ext cx="0" cy="0"/>
+          <a:chOff x="0" y="0"/>
+          <a:chExt cx="0" cy="0"/>
+        </a:xfrm>
+      </p:grpSpPr>
+      <p:pic>
+        <p:nvPicPr>
+          <p:cNvPr id="7" name="Picture 8" descr="Html 5 Detailed Flat Circular Flat icon">
+            <a:extLst>
+              <a:ext uri="{FF2B5EF4-FFF2-40B4-BE49-F238E27FC236}">
+                <a16:creationId xmlns:a16="http://schemas.microsoft.com/office/drawing/2014/main" id="{26F87EE6-249B-FFEB-B903-3F54D0D4EA22}"/>
+              </a:ext>
+            </a:extLst>
+          </p:cNvPr>
+          <p:cNvPicPr>
+            <a:picLocks noChangeAspect="1" noChangeArrowheads="1"/>
+          </p:cNvPicPr>
+          <p:nvPr/>
+        </p:nvPicPr>
+        <p:blipFill>
+          <a:blip r:embed="rId2">
+            <a:extLst>
+              <a:ext uri="{28A0092B-C50C-407E-A947-70E740481C1C}">
+                <a14:useLocalDpi xmlns:a14="http://schemas.microsoft.com/office/drawing/2010/main" val="0"/>
+              </a:ext>
+            </a:extLst>
+          </a:blip>
+          <a:srcRect/>
+          <a:stretch>
+            <a:fillRect/>
+          </a:stretch>
+        </p:blipFill>
+        <p:spPr bwMode="auto">
+          <a:xfrm>
+            <a:off x="1115070" y="1664302"/>
+            <a:ext cx="3318461" cy="3318461"/>
+          </a:xfrm>
+          <a:prstGeom prst="rect">
+            <a:avLst/>
+          </a:prstGeom>
+          <a:noFill/>
+          <a:extLst>
+            <a:ext uri="{909E8E84-426E-40DD-AFC4-6F175D3DCCD1}">
+              <a14:hiddenFill xmlns:a14="http://schemas.microsoft.com/office/drawing/2010/main">
+                <a:solidFill>
+                  <a:srgbClr val="FFFFFF"/>
+                </a:solidFill>
+              </a14:hiddenFill>
+            </a:ext>
+          </a:extLst>
+        </p:spPr>
+      </p:pic>
+      <p:sp>
+        <p:nvSpPr>
+          <p:cNvPr id="2" name="TextBox 1">
+            <a:extLst>
+              <a:ext uri="{FF2B5EF4-FFF2-40B4-BE49-F238E27FC236}">
+                <a16:creationId xmlns:a16="http://schemas.microsoft.com/office/drawing/2014/main" id="{5366957A-F718-3CBF-05E0-59417ACEB6A8}"/>
+              </a:ext>
+            </a:extLst>
+          </p:cNvPr>
+          <p:cNvSpPr txBox="1"/>
+          <p:nvPr/>
+        </p:nvSpPr>
+        <p:spPr>
+          <a:xfrm>
+            <a:off x="5340221" y="2321004"/>
+            <a:ext cx="5557935" cy="2215991"/>
+          </a:xfrm>
+          <a:prstGeom prst="rect">
+            <a:avLst/>
+          </a:prstGeom>
+          <a:noFill/>
+        </p:spPr>
+        <p:txBody>
+          <a:bodyPr wrap="square" rtlCol="0">
+            <a:spAutoFit/>
+          </a:bodyPr>
+          <a:lstStyle/>
+          <a:p>
+            <a:pPr algn="ctr"/>
+            <a:r>
+              <a:rPr lang="en-US" sz="13800" b="1" dirty="0">
+                <a:latin typeface="Khmer OS Siemreap" panose="02000500000000020004" pitchFamily="2" charset="0"/>
+                <a:cs typeface="Khmer OS Siemreap" panose="02000500000000020004" pitchFamily="2" charset="0"/>
+              </a:rPr>
+              <a:t>Demo</a:t>
+            </a:r>
+          </a:p>
+        </p:txBody>
+      </p:sp>
+    </p:spTree>
+    <p:extLst>
+      <p:ext uri="{BB962C8B-B14F-4D97-AF65-F5344CB8AC3E}">
         <p14:creationId xmlns:p14="http://schemas.microsoft.com/office/powerpoint/2010/main" val="1379005150"/>
+      </p:ext>
+    </p:extLst>
+  </p:cSld>
+  <p:clrMapOvr>
+    <a:masterClrMapping/>
+  </p:clrMapOvr>
+</p:sld>
+</file>
+
+<file path=ppt/slides/slide28.xml><?xml version="1.0" encoding="utf-8"?>
+<p:sld xmlns:a="http://schemas.openxmlformats.org/drawingml/2006/main" xmlns:r="http://schemas.openxmlformats.org/officeDocument/2006/relationships" xmlns:p="http://schemas.openxmlformats.org/presentationml/2006/main">
+  <p:cSld>
+    <p:spTree>
+      <p:nvGrpSpPr>
+        <p:cNvPr id="1" name=""/>
+        <p:cNvGrpSpPr/>
+        <p:nvPr/>
+      </p:nvGrpSpPr>
+      <p:grpSpPr>
+        <a:xfrm>
+          <a:off x="0" y="0"/>
+          <a:ext cx="0" cy="0"/>
+          <a:chOff x="0" y="0"/>
+          <a:chExt cx="0" cy="0"/>
+        </a:xfrm>
+      </p:grpSpPr>
+      <p:pic>
+        <p:nvPicPr>
+          <p:cNvPr id="7" name="Picture 8" descr="Html 5 Detailed Flat Circular Flat icon">
+            <a:extLst>
+              <a:ext uri="{FF2B5EF4-FFF2-40B4-BE49-F238E27FC236}">
+                <a16:creationId xmlns:a16="http://schemas.microsoft.com/office/drawing/2014/main" id="{26F87EE6-249B-FFEB-B903-3F54D0D4EA22}"/>
+              </a:ext>
+            </a:extLst>
+          </p:cNvPr>
+          <p:cNvPicPr>
+            <a:picLocks noChangeAspect="1" noChangeArrowheads="1"/>
+          </p:cNvPicPr>
+          <p:nvPr/>
+        </p:nvPicPr>
+        <p:blipFill>
+          <a:blip r:embed="rId2">
+            <a:extLst>
+              <a:ext uri="{28A0092B-C50C-407E-A947-70E740481C1C}">
+                <a14:useLocalDpi xmlns:a14="http://schemas.microsoft.com/office/drawing/2010/main" val="0"/>
+              </a:ext>
+            </a:extLst>
+          </a:blip>
+          <a:srcRect/>
+          <a:stretch>
+            <a:fillRect/>
+          </a:stretch>
+        </p:blipFill>
+        <p:spPr bwMode="auto">
+          <a:xfrm>
+            <a:off x="4436768" y="2121286"/>
+            <a:ext cx="3318461" cy="3318461"/>
+          </a:xfrm>
+          <a:prstGeom prst="rect">
+            <a:avLst/>
+          </a:prstGeom>
+          <a:noFill/>
+          <a:extLst>
+            <a:ext uri="{909E8E84-426E-40DD-AFC4-6F175D3DCCD1}">
+              <a14:hiddenFill xmlns:a14="http://schemas.microsoft.com/office/drawing/2010/main">
+                <a:solidFill>
+                  <a:srgbClr val="FFFFFF"/>
+                </a:solidFill>
+              </a14:hiddenFill>
+            </a:ext>
+          </a:extLst>
+        </p:spPr>
+      </p:pic>
+      <p:sp>
+        <p:nvSpPr>
+          <p:cNvPr id="2" name="TextBox 1">
+            <a:extLst>
+              <a:ext uri="{FF2B5EF4-FFF2-40B4-BE49-F238E27FC236}">
+                <a16:creationId xmlns:a16="http://schemas.microsoft.com/office/drawing/2014/main" id="{5366957A-F718-3CBF-05E0-59417ACEB6A8}"/>
+              </a:ext>
+            </a:extLst>
+          </p:cNvPr>
+          <p:cNvSpPr txBox="1"/>
+          <p:nvPr/>
+        </p:nvSpPr>
+        <p:spPr>
+          <a:xfrm>
+            <a:off x="954830" y="1197956"/>
+            <a:ext cx="10282335" cy="923330"/>
+          </a:xfrm>
+          <a:prstGeom prst="rect">
+            <a:avLst/>
+          </a:prstGeom>
+          <a:noFill/>
+        </p:spPr>
+        <p:txBody>
+          <a:bodyPr wrap="square" rtlCol="0">
+            <a:spAutoFit/>
+          </a:bodyPr>
+          <a:lstStyle/>
+          <a:p>
+            <a:pPr algn="ctr"/>
+            <a:r>
+              <a:rPr lang="km-KH" sz="5400" b="1" dirty="0">
+                <a:latin typeface="Khmer OS Siemreap" panose="02000500000000020004" pitchFamily="2" charset="0"/>
+                <a:cs typeface="Khmer OS Siemreap" panose="02000500000000020004" pitchFamily="2" charset="0"/>
+              </a:rPr>
+              <a:t>ការ អនុវត្តន៍ ប្រើប្រាស់ </a:t>
+            </a:r>
+            <a:r>
+              <a:rPr lang="en-US" sz="5400" b="1" dirty="0">
+                <a:latin typeface="Khmer OS Siemreap" panose="02000500000000020004" pitchFamily="2" charset="0"/>
+                <a:cs typeface="Khmer OS Siemreap" panose="02000500000000020004" pitchFamily="2" charset="0"/>
+              </a:rPr>
+              <a:t>HTML</a:t>
+            </a:r>
+          </a:p>
+        </p:txBody>
+      </p:sp>
+    </p:spTree>
+    <p:extLst>
+      <p:ext uri="{BB962C8B-B14F-4D97-AF65-F5344CB8AC3E}">
+        <p14:creationId xmlns:p14="http://schemas.microsoft.com/office/powerpoint/2010/main" val="3658540392"/>
+      </p:ext>
+    </p:extLst>
+  </p:cSld>
+  <p:clrMapOvr>
+    <a:masterClrMapping/>
+  </p:clrMapOvr>
+</p:sld>
+</file>
+
+<file path=ppt/slides/slide29.xml><?xml version="1.0" encoding="utf-8"?>
+<p:sld xmlns:a="http://schemas.openxmlformats.org/drawingml/2006/main" xmlns:r="http://schemas.openxmlformats.org/officeDocument/2006/relationships" xmlns:p="http://schemas.openxmlformats.org/presentationml/2006/main">
+  <p:cSld>
+    <p:spTree>
+      <p:nvGrpSpPr>
+        <p:cNvPr id="1" name=""/>
+        <p:cNvGrpSpPr/>
+        <p:nvPr/>
+      </p:nvGrpSpPr>
+      <p:grpSpPr>
+        <a:xfrm>
+          <a:off x="0" y="0"/>
+          <a:ext cx="0" cy="0"/>
+          <a:chOff x="0" y="0"/>
+          <a:chExt cx="0" cy="0"/>
+        </a:xfrm>
+      </p:grpSpPr>
+      <p:pic>
+        <p:nvPicPr>
+          <p:cNvPr id="7" name="Picture 8" descr="Html 5 Detailed Flat Circular Flat icon">
+            <a:extLst>
+              <a:ext uri="{FF2B5EF4-FFF2-40B4-BE49-F238E27FC236}">
+                <a16:creationId xmlns:a16="http://schemas.microsoft.com/office/drawing/2014/main" id="{26F87EE6-249B-FFEB-B903-3F54D0D4EA22}"/>
+              </a:ext>
+            </a:extLst>
+          </p:cNvPr>
+          <p:cNvPicPr>
+            <a:picLocks noChangeAspect="1" noChangeArrowheads="1"/>
+          </p:cNvPicPr>
+          <p:nvPr/>
+        </p:nvPicPr>
+        <p:blipFill>
+          <a:blip r:embed="rId2">
+            <a:extLst>
+              <a:ext uri="{28A0092B-C50C-407E-A947-70E740481C1C}">
+                <a14:useLocalDpi xmlns:a14="http://schemas.microsoft.com/office/drawing/2010/main" val="0"/>
+              </a:ext>
+            </a:extLst>
+          </a:blip>
+          <a:srcRect/>
+          <a:stretch>
+            <a:fillRect/>
+          </a:stretch>
+        </p:blipFill>
+        <p:spPr bwMode="auto">
+          <a:xfrm>
+            <a:off x="349960" y="1769769"/>
+            <a:ext cx="3318461" cy="3318461"/>
+          </a:xfrm>
+          <a:prstGeom prst="rect">
+            <a:avLst/>
+          </a:prstGeom>
+          <a:noFill/>
+          <a:extLst>
+            <a:ext uri="{909E8E84-426E-40DD-AFC4-6F175D3DCCD1}">
+              <a14:hiddenFill xmlns:a14="http://schemas.microsoft.com/office/drawing/2010/main">
+                <a:solidFill>
+                  <a:srgbClr val="FFFFFF"/>
+                </a:solidFill>
+              </a14:hiddenFill>
+            </a:ext>
+          </a:extLst>
+        </p:spPr>
+      </p:pic>
+      <p:sp>
+        <p:nvSpPr>
+          <p:cNvPr id="2" name="TextBox 1">
+            <a:extLst>
+              <a:ext uri="{FF2B5EF4-FFF2-40B4-BE49-F238E27FC236}">
+                <a16:creationId xmlns:a16="http://schemas.microsoft.com/office/drawing/2014/main" id="{5366957A-F718-3CBF-05E0-59417ACEB6A8}"/>
+              </a:ext>
+            </a:extLst>
+          </p:cNvPr>
+          <p:cNvSpPr txBox="1"/>
+          <p:nvPr/>
+        </p:nvSpPr>
+        <p:spPr>
+          <a:xfrm>
+            <a:off x="3511424" y="941780"/>
+            <a:ext cx="8535890" cy="4974439"/>
+          </a:xfrm>
+          <a:prstGeom prst="rect">
+            <a:avLst/>
+          </a:prstGeom>
+          <a:noFill/>
+        </p:spPr>
+        <p:txBody>
+          <a:bodyPr wrap="square" rtlCol="0">
+            <a:spAutoFit/>
+          </a:bodyPr>
+          <a:lstStyle/>
+          <a:p>
+            <a:pPr algn="ctr">
+              <a:lnSpc>
+                <a:spcPct val="150000"/>
+              </a:lnSpc>
+            </a:pPr>
+            <a:r>
+              <a:rPr lang="km-KH" sz="5400" b="1" dirty="0">
+                <a:latin typeface="Khmer OS Siemreap" panose="02000500000000020004" pitchFamily="2" charset="0"/>
+                <a:cs typeface="Khmer OS Siemreap" panose="02000500000000020004" pitchFamily="2" charset="0"/>
+              </a:rPr>
+              <a:t>សាកល្បង បង្កើតនូវវេបសាយថ្មីមួយដែលខ្លួនចង់បានដោយមានដាក់បញ្ចូលរូបភាព​, ការអក្សរទៅតាមសិល្បៈនៃការតុបតែង</a:t>
+            </a:r>
+            <a:endParaRPr lang="en-US" sz="5400" b="1" dirty="0">
+              <a:latin typeface="Khmer OS Siemreap" panose="02000500000000020004" pitchFamily="2" charset="0"/>
+              <a:cs typeface="Khmer OS Siemreap" panose="02000500000000020004" pitchFamily="2" charset="0"/>
+            </a:endParaRPr>
+          </a:p>
+        </p:txBody>
+      </p:sp>
+      <p:sp>
+        <p:nvSpPr>
+          <p:cNvPr id="3" name="TextBox 2">
+            <a:extLst>
+              <a:ext uri="{FF2B5EF4-FFF2-40B4-BE49-F238E27FC236}">
+                <a16:creationId xmlns:a16="http://schemas.microsoft.com/office/drawing/2014/main" id="{D3703452-55C6-BCCE-67D3-D23003ECAFC6}"/>
+              </a:ext>
+            </a:extLst>
+          </p:cNvPr>
+          <p:cNvSpPr txBox="1"/>
+          <p:nvPr/>
+        </p:nvSpPr>
+        <p:spPr>
+          <a:xfrm>
+            <a:off x="478970" y="302216"/>
+            <a:ext cx="3766460" cy="923330"/>
+          </a:xfrm>
+          <a:prstGeom prst="rect">
+            <a:avLst/>
+          </a:prstGeom>
+          <a:noFill/>
+        </p:spPr>
+        <p:txBody>
+          <a:bodyPr wrap="square" rtlCol="0">
+            <a:spAutoFit/>
+          </a:bodyPr>
+          <a:lstStyle/>
+          <a:p>
+            <a:r>
+              <a:rPr lang="km-KH" sz="5400" b="1" dirty="0">
+                <a:latin typeface="Khmer OS Siemreap" panose="02000500000000020004" pitchFamily="2" charset="0"/>
+                <a:cs typeface="Khmer OS Siemreap" panose="02000500000000020004" pitchFamily="2" charset="0"/>
+              </a:rPr>
+              <a:t>ការងារទី១</a:t>
+            </a:r>
+            <a:endParaRPr lang="en-US" sz="5400" b="1" dirty="0">
+              <a:latin typeface="Khmer OS Siemreap" panose="02000500000000020004" pitchFamily="2" charset="0"/>
+              <a:cs typeface="Khmer OS Siemreap" panose="02000500000000020004" pitchFamily="2" charset="0"/>
+            </a:endParaRPr>
+          </a:p>
+        </p:txBody>
+      </p:sp>
+    </p:spTree>
+    <p:extLst>
+      <p:ext uri="{BB962C8B-B14F-4D97-AF65-F5344CB8AC3E}">
+        <p14:creationId xmlns:p14="http://schemas.microsoft.com/office/powerpoint/2010/main" val="1573000916"/>
       </p:ext>
     </p:extLst>
   </p:cSld>
@@ -8068,6 +9294,384 @@
     <p:extLst>
       <p:ext uri="{BB962C8B-B14F-4D97-AF65-F5344CB8AC3E}">
         <p14:creationId xmlns:p14="http://schemas.microsoft.com/office/powerpoint/2010/main" val="3172222241"/>
+      </p:ext>
+    </p:extLst>
+  </p:cSld>
+  <p:clrMapOvr>
+    <a:masterClrMapping/>
+  </p:clrMapOvr>
+</p:sld>
+</file>
+
+<file path=ppt/slides/slide30.xml><?xml version="1.0" encoding="utf-8"?>
+<p:sld xmlns:a="http://schemas.openxmlformats.org/drawingml/2006/main" xmlns:r="http://schemas.openxmlformats.org/officeDocument/2006/relationships" xmlns:p="http://schemas.openxmlformats.org/presentationml/2006/main">
+  <p:cSld>
+    <p:spTree>
+      <p:nvGrpSpPr>
+        <p:cNvPr id="1" name=""/>
+        <p:cNvGrpSpPr/>
+        <p:nvPr/>
+      </p:nvGrpSpPr>
+      <p:grpSpPr>
+        <a:xfrm>
+          <a:off x="0" y="0"/>
+          <a:ext cx="0" cy="0"/>
+          <a:chOff x="0" y="0"/>
+          <a:chExt cx="0" cy="0"/>
+        </a:xfrm>
+      </p:grpSpPr>
+      <p:sp>
+        <p:nvSpPr>
+          <p:cNvPr id="2" name="TextBox 1">
+            <a:extLst>
+              <a:ext uri="{FF2B5EF4-FFF2-40B4-BE49-F238E27FC236}">
+                <a16:creationId xmlns:a16="http://schemas.microsoft.com/office/drawing/2014/main" id="{5366957A-F718-3CBF-05E0-59417ACEB6A8}"/>
+              </a:ext>
+            </a:extLst>
+          </p:cNvPr>
+          <p:cNvSpPr txBox="1"/>
+          <p:nvPr/>
+        </p:nvSpPr>
+        <p:spPr>
+          <a:xfrm>
+            <a:off x="482085" y="1105287"/>
+            <a:ext cx="11230945" cy="5755422"/>
+          </a:xfrm>
+          <a:prstGeom prst="rect">
+            <a:avLst/>
+          </a:prstGeom>
+          <a:noFill/>
+        </p:spPr>
+        <p:txBody>
+          <a:bodyPr wrap="square" rtlCol="0">
+            <a:spAutoFit/>
+          </a:bodyPr>
+          <a:lstStyle/>
+          <a:p>
+            <a:pPr algn="ctr">
+              <a:lnSpc>
+                <a:spcPct val="150000"/>
+              </a:lnSpc>
+            </a:pPr>
+            <a:r>
+              <a:rPr lang="km-KH" sz="2400" b="1" dirty="0">
+                <a:latin typeface="Khmer OS Siemreap" panose="02000500000000020004" pitchFamily="2" charset="0"/>
+                <a:cs typeface="Khmer OS Siemreap" panose="02000500000000020004" pitchFamily="2" charset="0"/>
+              </a:rPr>
+              <a:t>ក្រុមនីមួយៗនិងត្រូវជ្រើសរើសវិញ្ញាសារខាងក្រោមដើម្បីធ្វើការបង្កើតវេបសាយដោយប្រើ </a:t>
+            </a:r>
+            <a:r>
+              <a:rPr lang="en-US" sz="2400" b="1" dirty="0">
+                <a:latin typeface="Khmer OS Siemreap" panose="02000500000000020004" pitchFamily="2" charset="0"/>
+                <a:cs typeface="Khmer OS Siemreap" panose="02000500000000020004" pitchFamily="2" charset="0"/>
+              </a:rPr>
+              <a:t>HTML </a:t>
+            </a:r>
+            <a:r>
+              <a:rPr lang="km-KH" sz="2400" b="1" dirty="0">
+                <a:latin typeface="Khmer OS Siemreap" panose="02000500000000020004" pitchFamily="2" charset="0"/>
+                <a:cs typeface="Khmer OS Siemreap" panose="02000500000000020004" pitchFamily="2" charset="0"/>
+              </a:rPr>
+              <a:t>តាមប្រធានបទខាងក្រោម៖</a:t>
+            </a:r>
+          </a:p>
+          <a:p>
+            <a:pPr marL="514350" indent="-514350" algn="ctr">
+              <a:lnSpc>
+                <a:spcPct val="150000"/>
+              </a:lnSpc>
+              <a:buAutoNum type="arabicPeriod"/>
+            </a:pPr>
+            <a:r>
+              <a:rPr lang="km-KH" sz="2400" b="1" dirty="0">
+                <a:latin typeface="Khmer OS Siemreap" panose="02000500000000020004" pitchFamily="2" charset="0"/>
+                <a:cs typeface="Khmer OS Siemreap" panose="02000500000000020004" pitchFamily="2" charset="0"/>
+              </a:rPr>
+              <a:t>វេបសាយបង្ហាញពីតំបន់ទេសចរណ៍</a:t>
+            </a:r>
+          </a:p>
+          <a:p>
+            <a:pPr marL="514350" indent="-514350" algn="ctr">
+              <a:lnSpc>
+                <a:spcPct val="150000"/>
+              </a:lnSpc>
+              <a:buAutoNum type="arabicPeriod"/>
+            </a:pPr>
+            <a:r>
+              <a:rPr lang="km-KH" sz="2400" b="1" dirty="0">
+                <a:latin typeface="Khmer OS Siemreap" panose="02000500000000020004" pitchFamily="2" charset="0"/>
+                <a:cs typeface="Khmer OS Siemreap" panose="02000500000000020004" pitchFamily="2" charset="0"/>
+              </a:rPr>
+              <a:t>វេបសាយបង្ហាញពីសាលារៀន</a:t>
+            </a:r>
+          </a:p>
+          <a:p>
+            <a:pPr marL="514350" indent="-514350" algn="ctr">
+              <a:lnSpc>
+                <a:spcPct val="150000"/>
+              </a:lnSpc>
+              <a:buAutoNum type="arabicPeriod"/>
+            </a:pPr>
+            <a:r>
+              <a:rPr lang="km-KH" sz="2400" b="1" dirty="0">
+                <a:latin typeface="Khmer OS Siemreap" panose="02000500000000020004" pitchFamily="2" charset="0"/>
+                <a:cs typeface="Khmer OS Siemreap" panose="02000500000000020004" pitchFamily="2" charset="0"/>
+              </a:rPr>
+              <a:t>វេបសាយបង្ហាញពីកម្មវិធីបុណ្យចូលឆ្នាំខ្មែរ</a:t>
+            </a:r>
+          </a:p>
+          <a:p>
+            <a:pPr marL="514350" indent="-514350" algn="ctr">
+              <a:lnSpc>
+                <a:spcPct val="150000"/>
+              </a:lnSpc>
+              <a:buFontTx/>
+              <a:buAutoNum type="arabicPeriod"/>
+            </a:pPr>
+            <a:r>
+              <a:rPr lang="km-KH" sz="2400" b="1" dirty="0">
+                <a:latin typeface="Khmer OS Siemreap" panose="02000500000000020004" pitchFamily="2" charset="0"/>
+                <a:cs typeface="Khmer OS Siemreap" panose="02000500000000020004" pitchFamily="2" charset="0"/>
+              </a:rPr>
+              <a:t>វេបសាយបង្ហាញពីកម្មវិធីភ្ជុំបិណ្យ</a:t>
+            </a:r>
+          </a:p>
+          <a:p>
+            <a:pPr marL="514350" indent="-514350" algn="ctr">
+              <a:lnSpc>
+                <a:spcPct val="150000"/>
+              </a:lnSpc>
+              <a:buFontTx/>
+              <a:buAutoNum type="arabicPeriod"/>
+            </a:pPr>
+            <a:r>
+              <a:rPr lang="km-KH" sz="2400" b="1" dirty="0">
+                <a:latin typeface="Khmer OS Siemreap" panose="02000500000000020004" pitchFamily="2" charset="0"/>
+                <a:cs typeface="Khmer OS Siemreap" panose="02000500000000020004" pitchFamily="2" charset="0"/>
+              </a:rPr>
+              <a:t>វេបសាយបង្ហាញពីបច្ចេកវិទ្យា</a:t>
+            </a:r>
+          </a:p>
+          <a:p>
+            <a:pPr algn="ctr">
+              <a:lnSpc>
+                <a:spcPct val="150000"/>
+              </a:lnSpc>
+            </a:pPr>
+            <a:r>
+              <a:rPr lang="km-KH" sz="2400" b="1" dirty="0">
+                <a:latin typeface="Khmer OS Siemreap" panose="02000500000000020004" pitchFamily="2" charset="0"/>
+                <a:cs typeface="Khmer OS Siemreap" panose="02000500000000020004" pitchFamily="2" charset="0"/>
+              </a:rPr>
+              <a:t>ក្រុមនីមួយៗ មានពេលវេលាចំនួនមួយសបា្តហ៍ក្នុងការរៀបចំនូវលំហាត់ខាងលើដោយនិងមានការធ្វើបទបង្ហាញនូវសប្ដាហ៍ក្រោយ។</a:t>
+            </a:r>
+          </a:p>
+          <a:p>
+            <a:pPr marL="514350" indent="-514350" algn="ctr">
+              <a:lnSpc>
+                <a:spcPct val="150000"/>
+              </a:lnSpc>
+              <a:buAutoNum type="arabicPeriod"/>
+            </a:pPr>
+            <a:endParaRPr lang="en-US" sz="3200" b="1" dirty="0">
+              <a:latin typeface="Khmer OS Siemreap" panose="02000500000000020004" pitchFamily="2" charset="0"/>
+              <a:cs typeface="Khmer OS Siemreap" panose="02000500000000020004" pitchFamily="2" charset="0"/>
+            </a:endParaRPr>
+          </a:p>
+        </p:txBody>
+      </p:sp>
+      <p:sp>
+        <p:nvSpPr>
+          <p:cNvPr id="3" name="TextBox 2">
+            <a:extLst>
+              <a:ext uri="{FF2B5EF4-FFF2-40B4-BE49-F238E27FC236}">
+                <a16:creationId xmlns:a16="http://schemas.microsoft.com/office/drawing/2014/main" id="{D3703452-55C6-BCCE-67D3-D23003ECAFC6}"/>
+              </a:ext>
+            </a:extLst>
+          </p:cNvPr>
+          <p:cNvSpPr txBox="1"/>
+          <p:nvPr/>
+        </p:nvSpPr>
+        <p:spPr>
+          <a:xfrm>
+            <a:off x="478970" y="302216"/>
+            <a:ext cx="3766460" cy="923330"/>
+          </a:xfrm>
+          <a:prstGeom prst="rect">
+            <a:avLst/>
+          </a:prstGeom>
+          <a:noFill/>
+        </p:spPr>
+        <p:txBody>
+          <a:bodyPr wrap="square" rtlCol="0">
+            <a:spAutoFit/>
+          </a:bodyPr>
+          <a:lstStyle/>
+          <a:p>
+            <a:r>
+              <a:rPr lang="km-KH" sz="5400" b="1" dirty="0">
+                <a:latin typeface="Khmer OS Siemreap" panose="02000500000000020004" pitchFamily="2" charset="0"/>
+                <a:cs typeface="Khmer OS Siemreap" panose="02000500000000020004" pitchFamily="2" charset="0"/>
+              </a:rPr>
+              <a:t>ការងារទី២</a:t>
+            </a:r>
+            <a:endParaRPr lang="en-US" sz="5400" b="1" dirty="0">
+              <a:latin typeface="Khmer OS Siemreap" panose="02000500000000020004" pitchFamily="2" charset="0"/>
+              <a:cs typeface="Khmer OS Siemreap" panose="02000500000000020004" pitchFamily="2" charset="0"/>
+            </a:endParaRPr>
+          </a:p>
+        </p:txBody>
+      </p:sp>
+    </p:spTree>
+    <p:extLst>
+      <p:ext uri="{BB962C8B-B14F-4D97-AF65-F5344CB8AC3E}">
+        <p14:creationId xmlns:p14="http://schemas.microsoft.com/office/powerpoint/2010/main" val="1224539229"/>
+      </p:ext>
+    </p:extLst>
+  </p:cSld>
+  <p:clrMapOvr>
+    <a:masterClrMapping/>
+  </p:clrMapOvr>
+</p:sld>
+</file>
+
+<file path=ppt/slides/slide31.xml><?xml version="1.0" encoding="utf-8"?>
+<p:sld xmlns:a="http://schemas.openxmlformats.org/drawingml/2006/main" xmlns:r="http://schemas.openxmlformats.org/officeDocument/2006/relationships" xmlns:p="http://schemas.openxmlformats.org/presentationml/2006/main">
+  <p:cSld>
+    <p:spTree>
+      <p:nvGrpSpPr>
+        <p:cNvPr id="1" name=""/>
+        <p:cNvGrpSpPr/>
+        <p:nvPr/>
+      </p:nvGrpSpPr>
+      <p:grpSpPr>
+        <a:xfrm>
+          <a:off x="0" y="0"/>
+          <a:ext cx="0" cy="0"/>
+          <a:chOff x="0" y="0"/>
+          <a:chExt cx="0" cy="0"/>
+        </a:xfrm>
+      </p:grpSpPr>
+      <p:sp>
+        <p:nvSpPr>
+          <p:cNvPr id="3" name="TextBox 2">
+            <a:extLst>
+              <a:ext uri="{FF2B5EF4-FFF2-40B4-BE49-F238E27FC236}">
+                <a16:creationId xmlns:a16="http://schemas.microsoft.com/office/drawing/2014/main" id="{D3703452-55C6-BCCE-67D3-D23003ECAFC6}"/>
+              </a:ext>
+            </a:extLst>
+          </p:cNvPr>
+          <p:cNvSpPr txBox="1"/>
+          <p:nvPr/>
+        </p:nvSpPr>
+        <p:spPr>
+          <a:xfrm>
+            <a:off x="2355978" y="2321004"/>
+            <a:ext cx="7480043" cy="2215991"/>
+          </a:xfrm>
+          <a:prstGeom prst="rect">
+            <a:avLst/>
+          </a:prstGeom>
+          <a:noFill/>
+        </p:spPr>
+        <p:txBody>
+          <a:bodyPr wrap="square" rtlCol="0">
+            <a:spAutoFit/>
+          </a:bodyPr>
+          <a:lstStyle/>
+          <a:p>
+            <a:pPr algn="ctr"/>
+            <a:r>
+              <a:rPr lang="km-KH" sz="13800" b="1" dirty="0">
+                <a:latin typeface="Khmer OS Siemreap" panose="02000500000000020004" pitchFamily="2" charset="0"/>
+                <a:cs typeface="Khmer OS Siemreap" panose="02000500000000020004" pitchFamily="2" charset="0"/>
+              </a:rPr>
+              <a:t>សំណួរ?</a:t>
+            </a:r>
+            <a:endParaRPr lang="en-US" sz="13800" b="1" dirty="0">
+              <a:latin typeface="Khmer OS Siemreap" panose="02000500000000020004" pitchFamily="2" charset="0"/>
+              <a:cs typeface="Khmer OS Siemreap" panose="02000500000000020004" pitchFamily="2" charset="0"/>
+            </a:endParaRPr>
+          </a:p>
+        </p:txBody>
+      </p:sp>
+    </p:spTree>
+    <p:extLst>
+      <p:ext uri="{BB962C8B-B14F-4D97-AF65-F5344CB8AC3E}">
+        <p14:creationId xmlns:p14="http://schemas.microsoft.com/office/powerpoint/2010/main" val="1898887618"/>
+      </p:ext>
+    </p:extLst>
+  </p:cSld>
+  <p:clrMapOvr>
+    <a:masterClrMapping/>
+  </p:clrMapOvr>
+</p:sld>
+</file>
+
+<file path=ppt/slides/slide32.xml><?xml version="1.0" encoding="utf-8"?>
+<p:sld xmlns:a="http://schemas.openxmlformats.org/drawingml/2006/main" xmlns:r="http://schemas.openxmlformats.org/officeDocument/2006/relationships" xmlns:p="http://schemas.openxmlformats.org/presentationml/2006/main">
+  <p:cSld>
+    <p:spTree>
+      <p:nvGrpSpPr>
+        <p:cNvPr id="1" name=""/>
+        <p:cNvGrpSpPr/>
+        <p:nvPr/>
+      </p:nvGrpSpPr>
+      <p:grpSpPr>
+        <a:xfrm>
+          <a:off x="0" y="0"/>
+          <a:ext cx="0" cy="0"/>
+          <a:chOff x="0" y="0"/>
+          <a:chExt cx="0" cy="0"/>
+        </a:xfrm>
+      </p:grpSpPr>
+      <p:sp>
+        <p:nvSpPr>
+          <p:cNvPr id="3" name="TextBox 2">
+            <a:extLst>
+              <a:ext uri="{FF2B5EF4-FFF2-40B4-BE49-F238E27FC236}">
+                <a16:creationId xmlns:a16="http://schemas.microsoft.com/office/drawing/2014/main" id="{D3703452-55C6-BCCE-67D3-D23003ECAFC6}"/>
+              </a:ext>
+            </a:extLst>
+          </p:cNvPr>
+          <p:cNvSpPr txBox="1"/>
+          <p:nvPr/>
+        </p:nvSpPr>
+        <p:spPr>
+          <a:xfrm>
+            <a:off x="996820" y="1397274"/>
+            <a:ext cx="10198359" cy="4339650"/>
+          </a:xfrm>
+          <a:prstGeom prst="rect">
+            <a:avLst/>
+          </a:prstGeom>
+          <a:noFill/>
+        </p:spPr>
+        <p:txBody>
+          <a:bodyPr wrap="square" rtlCol="0">
+            <a:spAutoFit/>
+          </a:bodyPr>
+          <a:lstStyle/>
+          <a:p>
+            <a:pPr algn="ctr"/>
+            <a:r>
+              <a:rPr lang="km-KH" sz="13800" b="1" dirty="0">
+                <a:latin typeface="Khmer OS Siemreap" panose="02000500000000020004" pitchFamily="2" charset="0"/>
+                <a:cs typeface="Khmer OS Siemreap" panose="02000500000000020004" pitchFamily="2" charset="0"/>
+              </a:rPr>
+              <a:t>ជួបគ្នាសប្ដាហ៍ក្រោយ!</a:t>
+            </a:r>
+            <a:endParaRPr lang="en-US" sz="13800" b="1" dirty="0">
+              <a:latin typeface="Khmer OS Siemreap" panose="02000500000000020004" pitchFamily="2" charset="0"/>
+              <a:cs typeface="Khmer OS Siemreap" panose="02000500000000020004" pitchFamily="2" charset="0"/>
+            </a:endParaRPr>
+          </a:p>
+        </p:txBody>
+      </p:sp>
+    </p:spTree>
+    <p:extLst>
+      <p:ext uri="{BB962C8B-B14F-4D97-AF65-F5344CB8AC3E}">
+        <p14:creationId xmlns:p14="http://schemas.microsoft.com/office/powerpoint/2010/main" val="2949544485"/>
       </p:ext>
     </p:extLst>
   </p:cSld>

</xml_diff>